<commit_message>
Continuing work on the blog
</commit_message>
<xml_diff>
--- a/diagrams/ring_of_trust.pptx
+++ b/diagrams/ring_of_trust.pptx
@@ -7,7 +7,8 @@
   <p:sldIdLst>
     <p:sldId id="256" r:id="rId2"/>
     <p:sldId id="257" r:id="rId3"/>
-    <p:sldId id="258" r:id="rId4"/>
+    <p:sldId id="259" r:id="rId4"/>
+    <p:sldId id="258" r:id="rId5"/>
   </p:sldIdLst>
   <p:sldSz cx="12192000" cy="6858000"/>
   <p:notesSz cx="6858000" cy="9144000"/>
@@ -263,7 +264,7 @@
           <a:p>
             <a:fld id="{0AEA2568-A983-D342-AD56-032F9FF63BA4}" type="datetimeFigureOut">
               <a:rPr lang="en-US" smtClean="0"/>
-              <a:t>4/10/20</a:t>
+              <a:t>4/14/20</a:t>
             </a:fld>
             <a:endParaRPr lang="en-US"/>
           </a:p>
@@ -463,7 +464,7 @@
           <a:p>
             <a:fld id="{0AEA2568-A983-D342-AD56-032F9FF63BA4}" type="datetimeFigureOut">
               <a:rPr lang="en-US" smtClean="0"/>
-              <a:t>4/10/20</a:t>
+              <a:t>4/14/20</a:t>
             </a:fld>
             <a:endParaRPr lang="en-US"/>
           </a:p>
@@ -673,7 +674,7 @@
           <a:p>
             <a:fld id="{0AEA2568-A983-D342-AD56-032F9FF63BA4}" type="datetimeFigureOut">
               <a:rPr lang="en-US" smtClean="0"/>
-              <a:t>4/10/20</a:t>
+              <a:t>4/14/20</a:t>
             </a:fld>
             <a:endParaRPr lang="en-US"/>
           </a:p>
@@ -873,7 +874,7 @@
           <a:p>
             <a:fld id="{0AEA2568-A983-D342-AD56-032F9FF63BA4}" type="datetimeFigureOut">
               <a:rPr lang="en-US" smtClean="0"/>
-              <a:t>4/10/20</a:t>
+              <a:t>4/14/20</a:t>
             </a:fld>
             <a:endParaRPr lang="en-US"/>
           </a:p>
@@ -1149,7 +1150,7 @@
           <a:p>
             <a:fld id="{0AEA2568-A983-D342-AD56-032F9FF63BA4}" type="datetimeFigureOut">
               <a:rPr lang="en-US" smtClean="0"/>
-              <a:t>4/10/20</a:t>
+              <a:t>4/14/20</a:t>
             </a:fld>
             <a:endParaRPr lang="en-US"/>
           </a:p>
@@ -1417,7 +1418,7 @@
           <a:p>
             <a:fld id="{0AEA2568-A983-D342-AD56-032F9FF63BA4}" type="datetimeFigureOut">
               <a:rPr lang="en-US" smtClean="0"/>
-              <a:t>4/10/20</a:t>
+              <a:t>4/14/20</a:t>
             </a:fld>
             <a:endParaRPr lang="en-US"/>
           </a:p>
@@ -1832,7 +1833,7 @@
           <a:p>
             <a:fld id="{0AEA2568-A983-D342-AD56-032F9FF63BA4}" type="datetimeFigureOut">
               <a:rPr lang="en-US" smtClean="0"/>
-              <a:t>4/10/20</a:t>
+              <a:t>4/14/20</a:t>
             </a:fld>
             <a:endParaRPr lang="en-US"/>
           </a:p>
@@ -1974,7 +1975,7 @@
           <a:p>
             <a:fld id="{0AEA2568-A983-D342-AD56-032F9FF63BA4}" type="datetimeFigureOut">
               <a:rPr lang="en-US" smtClean="0"/>
-              <a:t>4/10/20</a:t>
+              <a:t>4/14/20</a:t>
             </a:fld>
             <a:endParaRPr lang="en-US"/>
           </a:p>
@@ -2087,7 +2088,7 @@
           <a:p>
             <a:fld id="{0AEA2568-A983-D342-AD56-032F9FF63BA4}" type="datetimeFigureOut">
               <a:rPr lang="en-US" smtClean="0"/>
-              <a:t>4/10/20</a:t>
+              <a:t>4/14/20</a:t>
             </a:fld>
             <a:endParaRPr lang="en-US"/>
           </a:p>
@@ -2400,7 +2401,7 @@
           <a:p>
             <a:fld id="{0AEA2568-A983-D342-AD56-032F9FF63BA4}" type="datetimeFigureOut">
               <a:rPr lang="en-US" smtClean="0"/>
-              <a:t>4/10/20</a:t>
+              <a:t>4/14/20</a:t>
             </a:fld>
             <a:endParaRPr lang="en-US"/>
           </a:p>
@@ -2689,7 +2690,7 @@
           <a:p>
             <a:fld id="{0AEA2568-A983-D342-AD56-032F9FF63BA4}" type="datetimeFigureOut">
               <a:rPr lang="en-US" smtClean="0"/>
-              <a:t>4/10/20</a:t>
+              <a:t>4/14/20</a:t>
             </a:fld>
             <a:endParaRPr lang="en-US"/>
           </a:p>
@@ -2932,7 +2933,7 @@
           <a:p>
             <a:fld id="{0AEA2568-A983-D342-AD56-032F9FF63BA4}" type="datetimeFigureOut">
               <a:rPr lang="en-US" smtClean="0"/>
-              <a:t>4/10/20</a:t>
+              <a:t>4/14/20</a:t>
             </a:fld>
             <a:endParaRPr lang="en-US"/>
           </a:p>
@@ -6268,6 +6269,2944 @@
           <a:chExt cx="0" cy="0"/>
         </a:xfrm>
       </p:grpSpPr>
+      <p:grpSp>
+        <p:nvGrpSpPr>
+          <p:cNvPr id="166" name="Group 165">
+            <a:extLst>
+              <a:ext uri="{FF2B5EF4-FFF2-40B4-BE49-F238E27FC236}">
+                <a16:creationId xmlns:a16="http://schemas.microsoft.com/office/drawing/2014/main" id="{48C47FA3-6858-7149-B3D6-10B47642A5BE}"/>
+              </a:ext>
+            </a:extLst>
+          </p:cNvPr>
+          <p:cNvGrpSpPr/>
+          <p:nvPr/>
+        </p:nvGrpSpPr>
+        <p:grpSpPr>
+          <a:xfrm>
+            <a:off x="4244400" y="3260931"/>
+            <a:ext cx="2203731" cy="1689983"/>
+            <a:chOff x="4241400" y="3239995"/>
+            <a:chExt cx="2203731" cy="1689983"/>
+          </a:xfrm>
+        </p:grpSpPr>
+        <p:grpSp>
+          <p:nvGrpSpPr>
+            <p:cNvPr id="84" name="Group 83">
+              <a:extLst>
+                <a:ext uri="{FF2B5EF4-FFF2-40B4-BE49-F238E27FC236}">
+                  <a16:creationId xmlns:a16="http://schemas.microsoft.com/office/drawing/2014/main" id="{A2FD318F-3512-C74A-B02E-E223C2F1BC85}"/>
+                </a:ext>
+              </a:extLst>
+            </p:cNvPr>
+            <p:cNvGrpSpPr/>
+            <p:nvPr/>
+          </p:nvGrpSpPr>
+          <p:grpSpPr>
+            <a:xfrm rot="18219271">
+              <a:off x="4849481" y="3334328"/>
+              <a:ext cx="1689983" cy="1501317"/>
+              <a:chOff x="9053119" y="2391307"/>
+              <a:chExt cx="1689983" cy="1501317"/>
+            </a:xfrm>
+          </p:grpSpPr>
+          <p:sp>
+            <p:nvSpPr>
+              <p:cNvPr id="92" name="Oval 91">
+                <a:extLst>
+                  <a:ext uri="{FF2B5EF4-FFF2-40B4-BE49-F238E27FC236}">
+                    <a16:creationId xmlns:a16="http://schemas.microsoft.com/office/drawing/2014/main" id="{96F94EC5-3AE5-2E40-AC03-A1C44F2096E0}"/>
+                  </a:ext>
+                </a:extLst>
+              </p:cNvPr>
+              <p:cNvSpPr/>
+              <p:nvPr/>
+            </p:nvSpPr>
+            <p:spPr>
+              <a:xfrm rot="20690382">
+                <a:off x="9053119" y="2391307"/>
+                <a:ext cx="478190" cy="478190"/>
+              </a:xfrm>
+              <a:prstGeom prst="ellipse">
+                <a:avLst/>
+              </a:prstGeom>
+              <a:solidFill>
+                <a:schemeClr val="bg2">
+                  <a:lumMod val="75000"/>
+                </a:schemeClr>
+              </a:solidFill>
+              <a:ln>
+                <a:noFill/>
+              </a:ln>
+            </p:spPr>
+            <p:style>
+              <a:lnRef idx="2">
+                <a:schemeClr val="accent1">
+                  <a:shade val="50000"/>
+                </a:schemeClr>
+              </a:lnRef>
+              <a:fillRef idx="1">
+                <a:schemeClr val="accent1"/>
+              </a:fillRef>
+              <a:effectRef idx="0">
+                <a:schemeClr val="accent1"/>
+              </a:effectRef>
+              <a:fontRef idx="minor">
+                <a:schemeClr val="lt1"/>
+              </a:fontRef>
+            </p:style>
+            <p:txBody>
+              <a:bodyPr rtlCol="0" anchor="ctr"/>
+              <a:lstStyle/>
+              <a:p>
+                <a:pPr algn="ctr"/>
+                <a:endParaRPr lang="en-US" dirty="0"/>
+              </a:p>
+            </p:txBody>
+          </p:sp>
+          <p:sp>
+            <p:nvSpPr>
+              <p:cNvPr id="85" name="Oval 84">
+                <a:extLst>
+                  <a:ext uri="{FF2B5EF4-FFF2-40B4-BE49-F238E27FC236}">
+                    <a16:creationId xmlns:a16="http://schemas.microsoft.com/office/drawing/2014/main" id="{59D59A7E-9FDF-7C4A-A797-C748E624CD5A}"/>
+                  </a:ext>
+                </a:extLst>
+              </p:cNvPr>
+              <p:cNvSpPr/>
+              <p:nvPr/>
+            </p:nvSpPr>
+            <p:spPr>
+              <a:xfrm>
+                <a:off x="9724055" y="2876726"/>
+                <a:ext cx="457200" cy="457200"/>
+              </a:xfrm>
+              <a:prstGeom prst="ellipse">
+                <a:avLst/>
+              </a:prstGeom>
+              <a:solidFill>
+                <a:srgbClr val="927E97"/>
+              </a:solidFill>
+              <a:ln>
+                <a:noFill/>
+              </a:ln>
+            </p:spPr>
+            <p:style>
+              <a:lnRef idx="2">
+                <a:schemeClr val="accent1">
+                  <a:shade val="50000"/>
+                </a:schemeClr>
+              </a:lnRef>
+              <a:fillRef idx="1">
+                <a:schemeClr val="accent1"/>
+              </a:fillRef>
+              <a:effectRef idx="0">
+                <a:schemeClr val="accent1"/>
+              </a:effectRef>
+              <a:fontRef idx="minor">
+                <a:schemeClr val="lt1"/>
+              </a:fontRef>
+            </p:style>
+            <p:txBody>
+              <a:bodyPr rtlCol="0" anchor="ctr"/>
+              <a:lstStyle/>
+              <a:p>
+                <a:pPr algn="ctr"/>
+                <a:endParaRPr lang="en-US"/>
+              </a:p>
+            </p:txBody>
+          </p:sp>
+          <p:sp>
+            <p:nvSpPr>
+              <p:cNvPr id="86" name="Oval 85">
+                <a:extLst>
+                  <a:ext uri="{FF2B5EF4-FFF2-40B4-BE49-F238E27FC236}">
+                    <a16:creationId xmlns:a16="http://schemas.microsoft.com/office/drawing/2014/main" id="{03B20948-DF0A-754C-ADE1-418AAE298CCB}"/>
+                  </a:ext>
+                </a:extLst>
+              </p:cNvPr>
+              <p:cNvSpPr/>
+              <p:nvPr/>
+            </p:nvSpPr>
+            <p:spPr>
+              <a:xfrm>
+                <a:off x="9417479" y="3401634"/>
+                <a:ext cx="205276" cy="205276"/>
+              </a:xfrm>
+              <a:prstGeom prst="ellipse">
+                <a:avLst/>
+              </a:prstGeom>
+              <a:solidFill>
+                <a:srgbClr val="927E97"/>
+              </a:solidFill>
+              <a:ln>
+                <a:noFill/>
+              </a:ln>
+            </p:spPr>
+            <p:style>
+              <a:lnRef idx="2">
+                <a:schemeClr val="accent1">
+                  <a:shade val="50000"/>
+                </a:schemeClr>
+              </a:lnRef>
+              <a:fillRef idx="1">
+                <a:schemeClr val="accent1"/>
+              </a:fillRef>
+              <a:effectRef idx="0">
+                <a:schemeClr val="accent1"/>
+              </a:effectRef>
+              <a:fontRef idx="minor">
+                <a:schemeClr val="lt1"/>
+              </a:fontRef>
+            </p:style>
+            <p:txBody>
+              <a:bodyPr rtlCol="0" anchor="ctr"/>
+              <a:lstStyle/>
+              <a:p>
+                <a:pPr algn="ctr"/>
+                <a:endParaRPr lang="en-US"/>
+              </a:p>
+            </p:txBody>
+          </p:sp>
+          <p:sp>
+            <p:nvSpPr>
+              <p:cNvPr id="87" name="Oval 86">
+                <a:extLst>
+                  <a:ext uri="{FF2B5EF4-FFF2-40B4-BE49-F238E27FC236}">
+                    <a16:creationId xmlns:a16="http://schemas.microsoft.com/office/drawing/2014/main" id="{C0D4F269-AC27-F841-9D00-80A9C0929F7B}"/>
+                  </a:ext>
+                </a:extLst>
+              </p:cNvPr>
+              <p:cNvSpPr/>
+              <p:nvPr/>
+            </p:nvSpPr>
+            <p:spPr>
+              <a:xfrm>
+                <a:off x="10400098" y="3549620"/>
+                <a:ext cx="343004" cy="343004"/>
+              </a:xfrm>
+              <a:prstGeom prst="ellipse">
+                <a:avLst/>
+              </a:prstGeom>
+              <a:solidFill>
+                <a:schemeClr val="accent2">
+                  <a:lumMod val="40000"/>
+                  <a:lumOff val="60000"/>
+                </a:schemeClr>
+              </a:solidFill>
+              <a:ln>
+                <a:noFill/>
+              </a:ln>
+            </p:spPr>
+            <p:style>
+              <a:lnRef idx="2">
+                <a:schemeClr val="accent1">
+                  <a:shade val="50000"/>
+                </a:schemeClr>
+              </a:lnRef>
+              <a:fillRef idx="1">
+                <a:schemeClr val="accent1"/>
+              </a:fillRef>
+              <a:effectRef idx="0">
+                <a:schemeClr val="accent1"/>
+              </a:effectRef>
+              <a:fontRef idx="minor">
+                <a:schemeClr val="lt1"/>
+              </a:fontRef>
+            </p:style>
+            <p:txBody>
+              <a:bodyPr rtlCol="0" anchor="ctr"/>
+              <a:lstStyle/>
+              <a:p>
+                <a:pPr algn="ctr"/>
+                <a:endParaRPr lang="en-US"/>
+              </a:p>
+            </p:txBody>
+          </p:sp>
+          <p:sp>
+            <p:nvSpPr>
+              <p:cNvPr id="88" name="Oval 87">
+                <a:extLst>
+                  <a:ext uri="{FF2B5EF4-FFF2-40B4-BE49-F238E27FC236}">
+                    <a16:creationId xmlns:a16="http://schemas.microsoft.com/office/drawing/2014/main" id="{BC66EFCD-7220-2E41-978D-7CF1EE0AFDC4}"/>
+                  </a:ext>
+                </a:extLst>
+              </p:cNvPr>
+              <p:cNvSpPr/>
+              <p:nvPr/>
+            </p:nvSpPr>
+            <p:spPr>
+              <a:xfrm rot="20097361">
+                <a:off x="9804438" y="2523125"/>
+                <a:ext cx="205276" cy="205276"/>
+              </a:xfrm>
+              <a:prstGeom prst="ellipse">
+                <a:avLst/>
+              </a:prstGeom>
+              <a:solidFill>
+                <a:schemeClr val="bg2">
+                  <a:lumMod val="90000"/>
+                </a:schemeClr>
+              </a:solidFill>
+              <a:ln>
+                <a:noFill/>
+              </a:ln>
+            </p:spPr>
+            <p:style>
+              <a:lnRef idx="2">
+                <a:schemeClr val="accent1">
+                  <a:shade val="50000"/>
+                </a:schemeClr>
+              </a:lnRef>
+              <a:fillRef idx="1">
+                <a:schemeClr val="accent1"/>
+              </a:fillRef>
+              <a:effectRef idx="0">
+                <a:schemeClr val="accent1"/>
+              </a:effectRef>
+              <a:fontRef idx="minor">
+                <a:schemeClr val="lt1"/>
+              </a:fontRef>
+            </p:style>
+            <p:txBody>
+              <a:bodyPr rtlCol="0" anchor="ctr"/>
+              <a:lstStyle/>
+              <a:p>
+                <a:pPr algn="ctr"/>
+                <a:endParaRPr lang="en-US"/>
+              </a:p>
+            </p:txBody>
+          </p:sp>
+          <p:cxnSp>
+            <p:nvCxnSpPr>
+              <p:cNvPr id="89" name="Straight Connector 88">
+                <a:extLst>
+                  <a:ext uri="{FF2B5EF4-FFF2-40B4-BE49-F238E27FC236}">
+                    <a16:creationId xmlns:a16="http://schemas.microsoft.com/office/drawing/2014/main" id="{14BB53C3-8AC9-774A-AFC8-A813B9E0886A}"/>
+                  </a:ext>
+                </a:extLst>
+              </p:cNvPr>
+              <p:cNvCxnSpPr>
+                <a:cxnSpLocks/>
+                <a:stCxn id="85" idx="0"/>
+                <a:endCxn id="88" idx="4"/>
+              </p:cNvCxnSpPr>
+              <p:nvPr/>
+            </p:nvCxnSpPr>
+            <p:spPr>
+              <a:xfrm rot="3380729" flipH="1" flipV="1">
+                <a:off x="9885250" y="2754853"/>
+                <a:ext cx="132679" cy="85773"/>
+              </a:xfrm>
+              <a:prstGeom prst="line">
+                <a:avLst/>
+              </a:prstGeom>
+              <a:ln w="22225">
+                <a:gradFill>
+                  <a:gsLst>
+                    <a:gs pos="0">
+                      <a:srgbClr val="927E97"/>
+                    </a:gs>
+                    <a:gs pos="32000">
+                      <a:srgbClr val="927E97"/>
+                    </a:gs>
+                    <a:gs pos="66000">
+                      <a:schemeClr val="bg2">
+                        <a:lumMod val="90000"/>
+                      </a:schemeClr>
+                    </a:gs>
+                    <a:gs pos="100000">
+                      <a:schemeClr val="bg2">
+                        <a:lumMod val="90000"/>
+                      </a:schemeClr>
+                    </a:gs>
+                  </a:gsLst>
+                  <a:lin ang="5400000" scaled="1"/>
+                </a:gradFill>
+              </a:ln>
+            </p:spPr>
+            <p:style>
+              <a:lnRef idx="1">
+                <a:schemeClr val="accent1"/>
+              </a:lnRef>
+              <a:fillRef idx="0">
+                <a:schemeClr val="accent1"/>
+              </a:fillRef>
+              <a:effectRef idx="0">
+                <a:schemeClr val="accent1"/>
+              </a:effectRef>
+              <a:fontRef idx="minor">
+                <a:schemeClr val="tx1"/>
+              </a:fontRef>
+            </p:style>
+          </p:cxnSp>
+          <p:cxnSp>
+            <p:nvCxnSpPr>
+              <p:cNvPr id="90" name="Straight Connector 89">
+                <a:extLst>
+                  <a:ext uri="{FF2B5EF4-FFF2-40B4-BE49-F238E27FC236}">
+                    <a16:creationId xmlns:a16="http://schemas.microsoft.com/office/drawing/2014/main" id="{BD610CAD-2651-DF4E-AB1E-C1B3FABA2324}"/>
+                  </a:ext>
+                </a:extLst>
+              </p:cNvPr>
+              <p:cNvCxnSpPr>
+                <a:cxnSpLocks/>
+                <a:stCxn id="85" idx="5"/>
+                <a:endCxn id="87" idx="1"/>
+              </p:cNvCxnSpPr>
+              <p:nvPr/>
+            </p:nvCxnSpPr>
+            <p:spPr>
+              <a:xfrm rot="3380729" flipV="1">
+                <a:off x="10050659" y="3385795"/>
+                <a:ext cx="463312" cy="95232"/>
+              </a:xfrm>
+              <a:prstGeom prst="line">
+                <a:avLst/>
+              </a:prstGeom>
+              <a:ln w="50800">
+                <a:gradFill>
+                  <a:gsLst>
+                    <a:gs pos="0">
+                      <a:srgbClr val="927E97"/>
+                    </a:gs>
+                    <a:gs pos="36000">
+                      <a:srgbClr val="927E97"/>
+                    </a:gs>
+                    <a:gs pos="72000">
+                      <a:schemeClr val="accent2">
+                        <a:lumMod val="40000"/>
+                        <a:lumOff val="60000"/>
+                      </a:schemeClr>
+                    </a:gs>
+                    <a:gs pos="100000">
+                      <a:schemeClr val="accent2">
+                        <a:lumMod val="40000"/>
+                        <a:lumOff val="60000"/>
+                      </a:schemeClr>
+                    </a:gs>
+                  </a:gsLst>
+                  <a:lin ang="5400000" scaled="1"/>
+                </a:gradFill>
+              </a:ln>
+            </p:spPr>
+            <p:style>
+              <a:lnRef idx="1">
+                <a:schemeClr val="accent1"/>
+              </a:lnRef>
+              <a:fillRef idx="0">
+                <a:schemeClr val="accent1"/>
+              </a:fillRef>
+              <a:effectRef idx="0">
+                <a:schemeClr val="accent1"/>
+              </a:effectRef>
+              <a:fontRef idx="minor">
+                <a:schemeClr val="tx1"/>
+              </a:fontRef>
+            </p:style>
+          </p:cxnSp>
+          <p:cxnSp>
+            <p:nvCxnSpPr>
+              <p:cNvPr id="91" name="Straight Connector 90">
+                <a:extLst>
+                  <a:ext uri="{FF2B5EF4-FFF2-40B4-BE49-F238E27FC236}">
+                    <a16:creationId xmlns:a16="http://schemas.microsoft.com/office/drawing/2014/main" id="{75C86A01-5C35-D44E-811B-E75B3EDDCA68}"/>
+                  </a:ext>
+                </a:extLst>
+              </p:cNvPr>
+              <p:cNvCxnSpPr>
+                <a:cxnSpLocks/>
+                <a:stCxn id="86" idx="7"/>
+                <a:endCxn id="85" idx="3"/>
+              </p:cNvCxnSpPr>
+              <p:nvPr/>
+            </p:nvCxnSpPr>
+            <p:spPr>
+              <a:xfrm rot="3380729" flipH="1" flipV="1">
+                <a:off x="9678245" y="3221150"/>
+                <a:ext cx="27213" cy="256367"/>
+              </a:xfrm>
+              <a:prstGeom prst="line">
+                <a:avLst/>
+              </a:prstGeom>
+              <a:solidFill>
+                <a:srgbClr val="927E97"/>
+              </a:solidFill>
+              <a:ln w="41275">
+                <a:solidFill>
+                  <a:srgbClr val="865790"/>
+                </a:solidFill>
+              </a:ln>
+            </p:spPr>
+            <p:style>
+              <a:lnRef idx="1">
+                <a:schemeClr val="accent1"/>
+              </a:lnRef>
+              <a:fillRef idx="0">
+                <a:schemeClr val="accent1"/>
+              </a:fillRef>
+              <a:effectRef idx="0">
+                <a:schemeClr val="accent1"/>
+              </a:effectRef>
+              <a:fontRef idx="minor">
+                <a:schemeClr val="tx1"/>
+              </a:fontRef>
+            </p:style>
+          </p:cxnSp>
+          <p:cxnSp>
+            <p:nvCxnSpPr>
+              <p:cNvPr id="93" name="Straight Connector 92">
+                <a:extLst>
+                  <a:ext uri="{FF2B5EF4-FFF2-40B4-BE49-F238E27FC236}">
+                    <a16:creationId xmlns:a16="http://schemas.microsoft.com/office/drawing/2014/main" id="{2D7582DF-E435-7C48-A2FA-E0F2D54E3724}"/>
+                  </a:ext>
+                </a:extLst>
+              </p:cNvPr>
+              <p:cNvCxnSpPr>
+                <a:cxnSpLocks/>
+                <a:stCxn id="85" idx="1"/>
+                <a:endCxn id="92" idx="5"/>
+              </p:cNvCxnSpPr>
+              <p:nvPr/>
+            </p:nvCxnSpPr>
+            <p:spPr>
+              <a:xfrm rot="3380729" flipH="1">
+                <a:off x="9483694" y="2779088"/>
+                <a:ext cx="323233" cy="134876"/>
+              </a:xfrm>
+              <a:prstGeom prst="line">
+                <a:avLst/>
+              </a:prstGeom>
+              <a:ln w="76200">
+                <a:gradFill flip="none" rotWithShape="1">
+                  <a:gsLst>
+                    <a:gs pos="0">
+                      <a:schemeClr val="bg2">
+                        <a:lumMod val="75000"/>
+                      </a:schemeClr>
+                    </a:gs>
+                    <a:gs pos="38000">
+                      <a:schemeClr val="bg2">
+                        <a:lumMod val="75000"/>
+                      </a:schemeClr>
+                    </a:gs>
+                    <a:gs pos="66000">
+                      <a:srgbClr val="927E97"/>
+                    </a:gs>
+                    <a:gs pos="100000">
+                      <a:srgbClr val="927E97"/>
+                    </a:gs>
+                  </a:gsLst>
+                  <a:lin ang="16200000" scaled="1"/>
+                  <a:tileRect/>
+                </a:gradFill>
+              </a:ln>
+            </p:spPr>
+            <p:style>
+              <a:lnRef idx="1">
+                <a:schemeClr val="accent1"/>
+              </a:lnRef>
+              <a:fillRef idx="0">
+                <a:schemeClr val="accent1"/>
+              </a:fillRef>
+              <a:effectRef idx="0">
+                <a:schemeClr val="accent1"/>
+              </a:effectRef>
+              <a:fontRef idx="minor">
+                <a:schemeClr val="tx1"/>
+              </a:fontRef>
+            </p:style>
+          </p:cxnSp>
+        </p:grpSp>
+        <p:cxnSp>
+          <p:nvCxnSpPr>
+            <p:cNvPr id="112" name="Straight Connector 111">
+              <a:extLst>
+                <a:ext uri="{FF2B5EF4-FFF2-40B4-BE49-F238E27FC236}">
+                  <a16:creationId xmlns:a16="http://schemas.microsoft.com/office/drawing/2014/main" id="{0E89F240-4DAD-D647-B98B-6ADE8B30C00E}"/>
+                </a:ext>
+              </a:extLst>
+            </p:cNvPr>
+            <p:cNvCxnSpPr>
+              <a:cxnSpLocks/>
+              <a:stCxn id="88" idx="0"/>
+              <a:endCxn id="113" idx="3"/>
+            </p:cNvCxnSpPr>
+            <p:nvPr/>
+          </p:nvCxnSpPr>
+          <p:spPr>
+            <a:xfrm flipH="1">
+              <a:off x="4572859" y="3776086"/>
+              <a:ext cx="595417" cy="69783"/>
+            </a:xfrm>
+            <a:prstGeom prst="line">
+              <a:avLst/>
+            </a:prstGeom>
+            <a:ln w="22225">
+              <a:gradFill>
+                <a:gsLst>
+                  <a:gs pos="0">
+                    <a:schemeClr val="bg2">
+                      <a:lumMod val="90000"/>
+                    </a:schemeClr>
+                  </a:gs>
+                  <a:gs pos="37000">
+                    <a:schemeClr val="bg2">
+                      <a:lumMod val="90000"/>
+                    </a:schemeClr>
+                  </a:gs>
+                  <a:gs pos="64000">
+                    <a:schemeClr val="accent4">
+                      <a:lumMod val="40000"/>
+                      <a:lumOff val="60000"/>
+                    </a:schemeClr>
+                  </a:gs>
+                  <a:gs pos="100000">
+                    <a:schemeClr val="accent4">
+                      <a:lumMod val="40000"/>
+                      <a:lumOff val="60000"/>
+                    </a:schemeClr>
+                  </a:gs>
+                </a:gsLst>
+                <a:lin ang="5400000" scaled="1"/>
+              </a:gradFill>
+            </a:ln>
+          </p:spPr>
+          <p:style>
+            <a:lnRef idx="1">
+              <a:schemeClr val="accent1"/>
+            </a:lnRef>
+            <a:fillRef idx="0">
+              <a:schemeClr val="accent1"/>
+            </a:fillRef>
+            <a:effectRef idx="0">
+              <a:schemeClr val="accent1"/>
+            </a:effectRef>
+            <a:fontRef idx="minor">
+              <a:schemeClr val="tx1"/>
+            </a:fontRef>
+          </p:style>
+        </p:cxnSp>
+        <p:sp>
+          <p:nvSpPr>
+            <p:cNvPr id="113" name="Oval 112">
+              <a:extLst>
+                <a:ext uri="{FF2B5EF4-FFF2-40B4-BE49-F238E27FC236}">
+                  <a16:creationId xmlns:a16="http://schemas.microsoft.com/office/drawing/2014/main" id="{46796CF9-13E0-1147-8239-42465F4816B5}"/>
+                </a:ext>
+              </a:extLst>
+            </p:cNvPr>
+            <p:cNvSpPr/>
+            <p:nvPr/>
+          </p:nvSpPr>
+          <p:spPr>
+            <a:xfrm rot="13511058">
+              <a:off x="4241400" y="3679606"/>
+              <a:ext cx="331460" cy="331460"/>
+            </a:xfrm>
+            <a:prstGeom prst="ellipse">
+              <a:avLst/>
+            </a:prstGeom>
+            <a:solidFill>
+              <a:schemeClr val="accent4">
+                <a:lumMod val="40000"/>
+                <a:lumOff val="60000"/>
+              </a:schemeClr>
+            </a:solidFill>
+            <a:ln>
+              <a:noFill/>
+            </a:ln>
+          </p:spPr>
+          <p:style>
+            <a:lnRef idx="2">
+              <a:schemeClr val="accent1">
+                <a:shade val="50000"/>
+              </a:schemeClr>
+            </a:lnRef>
+            <a:fillRef idx="1">
+              <a:schemeClr val="accent1"/>
+            </a:fillRef>
+            <a:effectRef idx="0">
+              <a:schemeClr val="accent1"/>
+            </a:effectRef>
+            <a:fontRef idx="minor">
+              <a:schemeClr val="lt1"/>
+            </a:fontRef>
+          </p:style>
+          <p:txBody>
+            <a:bodyPr rtlCol="0" anchor="ctr"/>
+            <a:lstStyle/>
+            <a:p>
+              <a:pPr algn="ctr"/>
+              <a:endParaRPr lang="en-US"/>
+            </a:p>
+          </p:txBody>
+        </p:sp>
+      </p:grpSp>
+      <p:grpSp>
+        <p:nvGrpSpPr>
+          <p:cNvPr id="167" name="Group 166">
+            <a:extLst>
+              <a:ext uri="{FF2B5EF4-FFF2-40B4-BE49-F238E27FC236}">
+                <a16:creationId xmlns:a16="http://schemas.microsoft.com/office/drawing/2014/main" id="{353DC005-931B-3440-808E-7F8B6F983793}"/>
+              </a:ext>
+            </a:extLst>
+          </p:cNvPr>
+          <p:cNvGrpSpPr/>
+          <p:nvPr/>
+        </p:nvGrpSpPr>
+        <p:grpSpPr>
+          <a:xfrm>
+            <a:off x="4650161" y="2007887"/>
+            <a:ext cx="1873766" cy="1291464"/>
+            <a:chOff x="4693505" y="1986147"/>
+            <a:chExt cx="1873766" cy="1291464"/>
+          </a:xfrm>
+        </p:grpSpPr>
+        <p:grpSp>
+          <p:nvGrpSpPr>
+            <p:cNvPr id="62" name="Group 61">
+              <a:extLst>
+                <a:ext uri="{FF2B5EF4-FFF2-40B4-BE49-F238E27FC236}">
+                  <a16:creationId xmlns:a16="http://schemas.microsoft.com/office/drawing/2014/main" id="{C8C65B01-4D18-BA47-9E41-E7E89A457531}"/>
+                </a:ext>
+              </a:extLst>
+            </p:cNvPr>
+            <p:cNvGrpSpPr/>
+            <p:nvPr/>
+          </p:nvGrpSpPr>
+          <p:grpSpPr>
+            <a:xfrm rot="6888871">
+              <a:off x="4701334" y="1978318"/>
+              <a:ext cx="1291464" cy="1307121"/>
+              <a:chOff x="9065849" y="2357217"/>
+              <a:chExt cx="1291464" cy="1307121"/>
+            </a:xfrm>
+          </p:grpSpPr>
+          <p:sp>
+            <p:nvSpPr>
+              <p:cNvPr id="37" name="Oval 36">
+                <a:extLst>
+                  <a:ext uri="{FF2B5EF4-FFF2-40B4-BE49-F238E27FC236}">
+                    <a16:creationId xmlns:a16="http://schemas.microsoft.com/office/drawing/2014/main" id="{1A53AB5B-9B14-E541-898C-18BC6D19BAC3}"/>
+                  </a:ext>
+                </a:extLst>
+              </p:cNvPr>
+              <p:cNvSpPr/>
+              <p:nvPr/>
+            </p:nvSpPr>
+            <p:spPr>
+              <a:xfrm>
+                <a:off x="9654298" y="2923899"/>
+                <a:ext cx="457200" cy="457200"/>
+              </a:xfrm>
+              <a:prstGeom prst="ellipse">
+                <a:avLst/>
+              </a:prstGeom>
+              <a:solidFill>
+                <a:schemeClr val="accent6">
+                  <a:lumMod val="40000"/>
+                  <a:lumOff val="60000"/>
+                </a:schemeClr>
+              </a:solidFill>
+              <a:ln>
+                <a:noFill/>
+              </a:ln>
+            </p:spPr>
+            <p:style>
+              <a:lnRef idx="2">
+                <a:schemeClr val="accent1">
+                  <a:shade val="50000"/>
+                </a:schemeClr>
+              </a:lnRef>
+              <a:fillRef idx="1">
+                <a:schemeClr val="accent1"/>
+              </a:fillRef>
+              <a:effectRef idx="0">
+                <a:schemeClr val="accent1"/>
+              </a:effectRef>
+              <a:fontRef idx="minor">
+                <a:schemeClr val="lt1"/>
+              </a:fontRef>
+            </p:style>
+            <p:txBody>
+              <a:bodyPr rtlCol="0" anchor="ctr"/>
+              <a:lstStyle/>
+              <a:p>
+                <a:pPr algn="ctr"/>
+                <a:endParaRPr lang="en-US"/>
+              </a:p>
+            </p:txBody>
+          </p:sp>
+          <p:sp>
+            <p:nvSpPr>
+              <p:cNvPr id="53" name="Oval 52">
+                <a:extLst>
+                  <a:ext uri="{FF2B5EF4-FFF2-40B4-BE49-F238E27FC236}">
+                    <a16:creationId xmlns:a16="http://schemas.microsoft.com/office/drawing/2014/main" id="{AAA2C2F0-3781-D34C-94ED-C7E36182B25F}"/>
+                  </a:ext>
+                </a:extLst>
+              </p:cNvPr>
+              <p:cNvSpPr/>
+              <p:nvPr/>
+            </p:nvSpPr>
+            <p:spPr>
+              <a:xfrm>
+                <a:off x="9417479" y="3401634"/>
+                <a:ext cx="205276" cy="205276"/>
+              </a:xfrm>
+              <a:prstGeom prst="ellipse">
+                <a:avLst/>
+              </a:prstGeom>
+              <a:solidFill>
+                <a:schemeClr val="accent6">
+                  <a:lumMod val="40000"/>
+                  <a:lumOff val="60000"/>
+                </a:schemeClr>
+              </a:solidFill>
+              <a:ln>
+                <a:noFill/>
+              </a:ln>
+            </p:spPr>
+            <p:style>
+              <a:lnRef idx="2">
+                <a:schemeClr val="accent1">
+                  <a:shade val="50000"/>
+                </a:schemeClr>
+              </a:lnRef>
+              <a:fillRef idx="1">
+                <a:schemeClr val="accent1"/>
+              </a:fillRef>
+              <a:effectRef idx="0">
+                <a:schemeClr val="accent1"/>
+              </a:effectRef>
+              <a:fontRef idx="minor">
+                <a:schemeClr val="lt1"/>
+              </a:fontRef>
+            </p:style>
+            <p:txBody>
+              <a:bodyPr rtlCol="0" anchor="ctr"/>
+              <a:lstStyle/>
+              <a:p>
+                <a:pPr algn="ctr"/>
+                <a:endParaRPr lang="en-US"/>
+              </a:p>
+            </p:txBody>
+          </p:sp>
+          <p:sp>
+            <p:nvSpPr>
+              <p:cNvPr id="54" name="Oval 53">
+                <a:extLst>
+                  <a:ext uri="{FF2B5EF4-FFF2-40B4-BE49-F238E27FC236}">
+                    <a16:creationId xmlns:a16="http://schemas.microsoft.com/office/drawing/2014/main" id="{3E3197B6-956E-CD41-8B88-6AD252B5B1D0}"/>
+                  </a:ext>
+                </a:extLst>
+              </p:cNvPr>
+              <p:cNvSpPr/>
+              <p:nvPr/>
+            </p:nvSpPr>
+            <p:spPr>
+              <a:xfrm>
+                <a:off x="10152037" y="3459062"/>
+                <a:ext cx="205276" cy="205276"/>
+              </a:xfrm>
+              <a:prstGeom prst="ellipse">
+                <a:avLst/>
+              </a:prstGeom>
+              <a:solidFill>
+                <a:schemeClr val="accent4">
+                  <a:lumMod val="40000"/>
+                  <a:lumOff val="60000"/>
+                </a:schemeClr>
+              </a:solidFill>
+              <a:ln>
+                <a:noFill/>
+              </a:ln>
+            </p:spPr>
+            <p:style>
+              <a:lnRef idx="2">
+                <a:schemeClr val="accent1">
+                  <a:shade val="50000"/>
+                </a:schemeClr>
+              </a:lnRef>
+              <a:fillRef idx="1">
+                <a:schemeClr val="accent1"/>
+              </a:fillRef>
+              <a:effectRef idx="0">
+                <a:schemeClr val="accent1"/>
+              </a:effectRef>
+              <a:fontRef idx="minor">
+                <a:schemeClr val="lt1"/>
+              </a:fontRef>
+            </p:style>
+            <p:txBody>
+              <a:bodyPr rtlCol="0" anchor="ctr"/>
+              <a:lstStyle/>
+              <a:p>
+                <a:pPr algn="ctr"/>
+                <a:endParaRPr lang="en-US"/>
+              </a:p>
+            </p:txBody>
+          </p:sp>
+          <p:sp>
+            <p:nvSpPr>
+              <p:cNvPr id="55" name="Oval 54">
+                <a:extLst>
+                  <a:ext uri="{FF2B5EF4-FFF2-40B4-BE49-F238E27FC236}">
+                    <a16:creationId xmlns:a16="http://schemas.microsoft.com/office/drawing/2014/main" id="{0726A564-1066-7F45-B7C8-109DA3E59FD9}"/>
+                  </a:ext>
+                </a:extLst>
+              </p:cNvPr>
+              <p:cNvSpPr/>
+              <p:nvPr/>
+            </p:nvSpPr>
+            <p:spPr>
+              <a:xfrm rot="1174769">
+                <a:off x="9856285" y="2608427"/>
+                <a:ext cx="205276" cy="205276"/>
+              </a:xfrm>
+              <a:prstGeom prst="ellipse">
+                <a:avLst/>
+              </a:prstGeom>
+              <a:solidFill>
+                <a:schemeClr val="bg2">
+                  <a:lumMod val="90000"/>
+                </a:schemeClr>
+              </a:solidFill>
+              <a:ln>
+                <a:noFill/>
+              </a:ln>
+            </p:spPr>
+            <p:style>
+              <a:lnRef idx="2">
+                <a:schemeClr val="accent1">
+                  <a:shade val="50000"/>
+                </a:schemeClr>
+              </a:lnRef>
+              <a:fillRef idx="1">
+                <a:schemeClr val="accent1"/>
+              </a:fillRef>
+              <a:effectRef idx="0">
+                <a:schemeClr val="accent1"/>
+              </a:effectRef>
+              <a:fontRef idx="minor">
+                <a:schemeClr val="lt1"/>
+              </a:fontRef>
+            </p:style>
+            <p:txBody>
+              <a:bodyPr rtlCol="0" anchor="ctr"/>
+              <a:lstStyle/>
+              <a:p>
+                <a:pPr algn="ctr"/>
+                <a:endParaRPr lang="en-US"/>
+              </a:p>
+            </p:txBody>
+          </p:sp>
+          <p:cxnSp>
+            <p:nvCxnSpPr>
+              <p:cNvPr id="39" name="Straight Connector 38">
+                <a:extLst>
+                  <a:ext uri="{FF2B5EF4-FFF2-40B4-BE49-F238E27FC236}">
+                    <a16:creationId xmlns:a16="http://schemas.microsoft.com/office/drawing/2014/main" id="{647BED71-2BD9-1A43-B89B-67A2B6C50D3B}"/>
+                  </a:ext>
+                </a:extLst>
+              </p:cNvPr>
+              <p:cNvCxnSpPr>
+                <a:cxnSpLocks/>
+                <a:stCxn id="37" idx="0"/>
+                <a:endCxn id="55" idx="4"/>
+              </p:cNvCxnSpPr>
+              <p:nvPr/>
+            </p:nvCxnSpPr>
+            <p:spPr>
+              <a:xfrm rot="14711129">
+                <a:off x="9859745" y="2822571"/>
+                <a:ext cx="87936" cy="86525"/>
+              </a:xfrm>
+              <a:prstGeom prst="line">
+                <a:avLst/>
+              </a:prstGeom>
+              <a:ln w="22225">
+                <a:gradFill>
+                  <a:gsLst>
+                    <a:gs pos="0">
+                      <a:schemeClr val="accent6">
+                        <a:lumMod val="40000"/>
+                        <a:lumOff val="60000"/>
+                      </a:schemeClr>
+                    </a:gs>
+                    <a:gs pos="39000">
+                      <a:schemeClr val="accent6">
+                        <a:lumMod val="40000"/>
+                        <a:lumOff val="60000"/>
+                      </a:schemeClr>
+                    </a:gs>
+                    <a:gs pos="60000">
+                      <a:schemeClr val="bg2">
+                        <a:lumMod val="90000"/>
+                      </a:schemeClr>
+                    </a:gs>
+                    <a:gs pos="100000">
+                      <a:schemeClr val="bg2">
+                        <a:lumMod val="90000"/>
+                      </a:schemeClr>
+                    </a:gs>
+                  </a:gsLst>
+                  <a:lin ang="5400000" scaled="1"/>
+                </a:gradFill>
+              </a:ln>
+            </p:spPr>
+            <p:style>
+              <a:lnRef idx="1">
+                <a:schemeClr val="accent1"/>
+              </a:lnRef>
+              <a:fillRef idx="0">
+                <a:schemeClr val="accent1"/>
+              </a:fillRef>
+              <a:effectRef idx="0">
+                <a:schemeClr val="accent1"/>
+              </a:effectRef>
+              <a:fontRef idx="minor">
+                <a:schemeClr val="tx1"/>
+              </a:fontRef>
+            </p:style>
+          </p:cxnSp>
+          <p:cxnSp>
+            <p:nvCxnSpPr>
+              <p:cNvPr id="44" name="Straight Connector 43">
+                <a:extLst>
+                  <a:ext uri="{FF2B5EF4-FFF2-40B4-BE49-F238E27FC236}">
+                    <a16:creationId xmlns:a16="http://schemas.microsoft.com/office/drawing/2014/main" id="{EC379DEE-B81C-3A47-9687-472E06D3F164}"/>
+                  </a:ext>
+                </a:extLst>
+              </p:cNvPr>
+              <p:cNvCxnSpPr>
+                <a:stCxn id="37" idx="5"/>
+                <a:endCxn id="54" idx="1"/>
+              </p:cNvCxnSpPr>
+              <p:nvPr/>
+            </p:nvCxnSpPr>
+            <p:spPr>
+              <a:xfrm>
+                <a:off x="10044543" y="3314144"/>
+                <a:ext cx="137556" cy="174980"/>
+              </a:xfrm>
+              <a:prstGeom prst="line">
+                <a:avLst/>
+              </a:prstGeom>
+              <a:ln w="22225">
+                <a:gradFill>
+                  <a:gsLst>
+                    <a:gs pos="0">
+                      <a:schemeClr val="accent6">
+                        <a:lumMod val="40000"/>
+                        <a:lumOff val="60000"/>
+                      </a:schemeClr>
+                    </a:gs>
+                    <a:gs pos="36000">
+                      <a:schemeClr val="accent6">
+                        <a:lumMod val="40000"/>
+                        <a:lumOff val="60000"/>
+                      </a:schemeClr>
+                    </a:gs>
+                    <a:gs pos="64000">
+                      <a:schemeClr val="accent4">
+                        <a:lumMod val="40000"/>
+                        <a:lumOff val="60000"/>
+                      </a:schemeClr>
+                    </a:gs>
+                    <a:gs pos="100000">
+                      <a:schemeClr val="accent4">
+                        <a:lumMod val="40000"/>
+                        <a:lumOff val="60000"/>
+                      </a:schemeClr>
+                    </a:gs>
+                  </a:gsLst>
+                  <a:lin ang="5400000" scaled="1"/>
+                </a:gradFill>
+              </a:ln>
+            </p:spPr>
+            <p:style>
+              <a:lnRef idx="1">
+                <a:schemeClr val="accent1"/>
+              </a:lnRef>
+              <a:fillRef idx="0">
+                <a:schemeClr val="accent1"/>
+              </a:fillRef>
+              <a:effectRef idx="0">
+                <a:schemeClr val="accent1"/>
+              </a:effectRef>
+              <a:fontRef idx="minor">
+                <a:schemeClr val="tx1"/>
+              </a:fontRef>
+            </p:style>
+          </p:cxnSp>
+          <p:cxnSp>
+            <p:nvCxnSpPr>
+              <p:cNvPr id="47" name="Straight Connector 46">
+                <a:extLst>
+                  <a:ext uri="{FF2B5EF4-FFF2-40B4-BE49-F238E27FC236}">
+                    <a16:creationId xmlns:a16="http://schemas.microsoft.com/office/drawing/2014/main" id="{674AABCE-E3E3-904A-8650-1C2132610D53}"/>
+                  </a:ext>
+                </a:extLst>
+              </p:cNvPr>
+              <p:cNvCxnSpPr>
+                <a:stCxn id="53" idx="7"/>
+                <a:endCxn id="37" idx="3"/>
+              </p:cNvCxnSpPr>
+              <p:nvPr/>
+            </p:nvCxnSpPr>
+            <p:spPr>
+              <a:xfrm flipV="1">
+                <a:off x="9592693" y="3314144"/>
+                <a:ext cx="128560" cy="117552"/>
+              </a:xfrm>
+              <a:prstGeom prst="line">
+                <a:avLst/>
+              </a:prstGeom>
+              <a:ln w="22225">
+                <a:solidFill>
+                  <a:schemeClr val="accent6">
+                    <a:lumMod val="40000"/>
+                    <a:lumOff val="60000"/>
+                  </a:schemeClr>
+                </a:solidFill>
+              </a:ln>
+            </p:spPr>
+            <p:style>
+              <a:lnRef idx="1">
+                <a:schemeClr val="accent1"/>
+              </a:lnRef>
+              <a:fillRef idx="0">
+                <a:schemeClr val="accent1"/>
+              </a:fillRef>
+              <a:effectRef idx="0">
+                <a:schemeClr val="accent1"/>
+              </a:effectRef>
+              <a:fontRef idx="minor">
+                <a:schemeClr val="tx1"/>
+              </a:fontRef>
+            </p:style>
+          </p:cxnSp>
+          <p:sp>
+            <p:nvSpPr>
+              <p:cNvPr id="50" name="Oval 49">
+                <a:extLst>
+                  <a:ext uri="{FF2B5EF4-FFF2-40B4-BE49-F238E27FC236}">
+                    <a16:creationId xmlns:a16="http://schemas.microsoft.com/office/drawing/2014/main" id="{C4149977-D16C-AD48-8C23-F9C9D18242A2}"/>
+                  </a:ext>
+                </a:extLst>
+              </p:cNvPr>
+              <p:cNvSpPr/>
+              <p:nvPr/>
+            </p:nvSpPr>
+            <p:spPr>
+              <a:xfrm>
+                <a:off x="9065849" y="2357217"/>
+                <a:ext cx="478190" cy="478190"/>
+              </a:xfrm>
+              <a:prstGeom prst="ellipse">
+                <a:avLst/>
+              </a:prstGeom>
+              <a:solidFill>
+                <a:schemeClr val="accent5">
+                  <a:lumMod val="40000"/>
+                  <a:lumOff val="60000"/>
+                </a:schemeClr>
+              </a:solidFill>
+              <a:ln>
+                <a:noFill/>
+              </a:ln>
+            </p:spPr>
+            <p:style>
+              <a:lnRef idx="2">
+                <a:schemeClr val="accent1">
+                  <a:shade val="50000"/>
+                </a:schemeClr>
+              </a:lnRef>
+              <a:fillRef idx="1">
+                <a:schemeClr val="accent1"/>
+              </a:fillRef>
+              <a:effectRef idx="0">
+                <a:schemeClr val="accent1"/>
+              </a:effectRef>
+              <a:fontRef idx="minor">
+                <a:schemeClr val="lt1"/>
+              </a:fontRef>
+            </p:style>
+            <p:txBody>
+              <a:bodyPr rtlCol="0" anchor="ctr"/>
+              <a:lstStyle/>
+              <a:p>
+                <a:pPr algn="ctr"/>
+                <a:endParaRPr lang="en-US"/>
+              </a:p>
+            </p:txBody>
+          </p:sp>
+          <p:cxnSp>
+            <p:nvCxnSpPr>
+              <p:cNvPr id="52" name="Straight Connector 51">
+                <a:extLst>
+                  <a:ext uri="{FF2B5EF4-FFF2-40B4-BE49-F238E27FC236}">
+                    <a16:creationId xmlns:a16="http://schemas.microsoft.com/office/drawing/2014/main" id="{1D76DDF5-9A34-BC4F-AAEA-180FE0785DFF}"/>
+                  </a:ext>
+                </a:extLst>
+              </p:cNvPr>
+              <p:cNvCxnSpPr>
+                <a:cxnSpLocks/>
+                <a:stCxn id="37" idx="1"/>
+                <a:endCxn id="50" idx="5"/>
+              </p:cNvCxnSpPr>
+              <p:nvPr/>
+            </p:nvCxnSpPr>
+            <p:spPr>
+              <a:xfrm flipH="1" flipV="1">
+                <a:off x="9474010" y="2765378"/>
+                <a:ext cx="247243" cy="225476"/>
+              </a:xfrm>
+              <a:prstGeom prst="line">
+                <a:avLst/>
+              </a:prstGeom>
+              <a:ln w="76200">
+                <a:gradFill flip="none" rotWithShape="1">
+                  <a:gsLst>
+                    <a:gs pos="0">
+                      <a:schemeClr val="accent5">
+                        <a:lumMod val="40000"/>
+                        <a:lumOff val="60000"/>
+                      </a:schemeClr>
+                    </a:gs>
+                    <a:gs pos="38000">
+                      <a:schemeClr val="accent5">
+                        <a:lumMod val="40000"/>
+                        <a:lumOff val="60000"/>
+                      </a:schemeClr>
+                    </a:gs>
+                    <a:gs pos="66000">
+                      <a:schemeClr val="accent6">
+                        <a:lumMod val="40000"/>
+                        <a:lumOff val="60000"/>
+                      </a:schemeClr>
+                    </a:gs>
+                    <a:gs pos="100000">
+                      <a:schemeClr val="accent6">
+                        <a:lumMod val="40000"/>
+                        <a:lumOff val="60000"/>
+                      </a:schemeClr>
+                    </a:gs>
+                  </a:gsLst>
+                  <a:lin ang="16200000" scaled="1"/>
+                  <a:tileRect/>
+                </a:gradFill>
+              </a:ln>
+            </p:spPr>
+            <p:style>
+              <a:lnRef idx="1">
+                <a:schemeClr val="accent1"/>
+              </a:lnRef>
+              <a:fillRef idx="0">
+                <a:schemeClr val="accent1"/>
+              </a:fillRef>
+              <a:effectRef idx="0">
+                <a:schemeClr val="accent1"/>
+              </a:effectRef>
+              <a:fontRef idx="minor">
+                <a:schemeClr val="tx1"/>
+              </a:fontRef>
+            </p:style>
+          </p:cxnSp>
+        </p:grpSp>
+        <p:sp>
+          <p:nvSpPr>
+            <p:cNvPr id="123" name="Oval 122">
+              <a:extLst>
+                <a:ext uri="{FF2B5EF4-FFF2-40B4-BE49-F238E27FC236}">
+                  <a16:creationId xmlns:a16="http://schemas.microsoft.com/office/drawing/2014/main" id="{50B389C2-AD7A-BA47-B2BD-952C4B178A29}"/>
+                </a:ext>
+              </a:extLst>
+            </p:cNvPr>
+            <p:cNvSpPr/>
+            <p:nvPr/>
+          </p:nvSpPr>
+          <p:spPr>
+            <a:xfrm rot="8063640">
+              <a:off x="6361995" y="2761981"/>
+              <a:ext cx="205276" cy="205276"/>
+            </a:xfrm>
+            <a:prstGeom prst="ellipse">
+              <a:avLst/>
+            </a:prstGeom>
+            <a:solidFill>
+              <a:schemeClr val="accent2">
+                <a:lumMod val="60000"/>
+                <a:lumOff val="40000"/>
+              </a:schemeClr>
+            </a:solidFill>
+            <a:ln>
+              <a:noFill/>
+            </a:ln>
+          </p:spPr>
+          <p:style>
+            <a:lnRef idx="2">
+              <a:schemeClr val="accent1">
+                <a:shade val="50000"/>
+              </a:schemeClr>
+            </a:lnRef>
+            <a:fillRef idx="1">
+              <a:schemeClr val="accent1"/>
+            </a:fillRef>
+            <a:effectRef idx="0">
+              <a:schemeClr val="accent1"/>
+            </a:effectRef>
+            <a:fontRef idx="minor">
+              <a:schemeClr val="lt1"/>
+            </a:fontRef>
+          </p:style>
+          <p:txBody>
+            <a:bodyPr rtlCol="0" anchor="ctr"/>
+            <a:lstStyle/>
+            <a:p>
+              <a:pPr algn="ctr"/>
+              <a:endParaRPr lang="en-US"/>
+            </a:p>
+          </p:txBody>
+        </p:sp>
+        <p:cxnSp>
+          <p:nvCxnSpPr>
+            <p:cNvPr id="124" name="Straight Connector 123">
+              <a:extLst>
+                <a:ext uri="{FF2B5EF4-FFF2-40B4-BE49-F238E27FC236}">
+                  <a16:creationId xmlns:a16="http://schemas.microsoft.com/office/drawing/2014/main" id="{BA476A0C-677C-934A-84C8-30F526B000EE}"/>
+                </a:ext>
+              </a:extLst>
+            </p:cNvPr>
+            <p:cNvCxnSpPr>
+              <a:cxnSpLocks/>
+              <a:stCxn id="50" idx="0"/>
+              <a:endCxn id="123" idx="4"/>
+            </p:cNvCxnSpPr>
+            <p:nvPr/>
+          </p:nvCxnSpPr>
+          <p:spPr>
+            <a:xfrm>
+              <a:off x="6110943" y="2537074"/>
+              <a:ext cx="280350" cy="255741"/>
+            </a:xfrm>
+            <a:prstGeom prst="line">
+              <a:avLst/>
+            </a:prstGeom>
+            <a:ln w="22225">
+              <a:gradFill>
+                <a:gsLst>
+                  <a:gs pos="0">
+                    <a:schemeClr val="accent1">
+                      <a:lumMod val="5000"/>
+                      <a:lumOff val="95000"/>
+                    </a:schemeClr>
+                  </a:gs>
+                  <a:gs pos="33000">
+                    <a:schemeClr val="accent1">
+                      <a:lumMod val="45000"/>
+                      <a:lumOff val="55000"/>
+                    </a:schemeClr>
+                  </a:gs>
+                  <a:gs pos="62000">
+                    <a:schemeClr val="accent2">
+                      <a:lumMod val="40000"/>
+                      <a:lumOff val="60000"/>
+                    </a:schemeClr>
+                  </a:gs>
+                  <a:gs pos="100000">
+                    <a:schemeClr val="accent2">
+                      <a:lumMod val="40000"/>
+                      <a:lumOff val="60000"/>
+                    </a:schemeClr>
+                  </a:gs>
+                </a:gsLst>
+                <a:lin ang="5400000" scaled="1"/>
+              </a:gradFill>
+            </a:ln>
+          </p:spPr>
+          <p:style>
+            <a:lnRef idx="1">
+              <a:schemeClr val="accent1"/>
+            </a:lnRef>
+            <a:fillRef idx="0">
+              <a:schemeClr val="accent1"/>
+            </a:fillRef>
+            <a:effectRef idx="0">
+              <a:schemeClr val="accent1"/>
+            </a:effectRef>
+            <a:fontRef idx="minor">
+              <a:schemeClr val="tx1"/>
+            </a:fontRef>
+          </p:style>
+        </p:cxnSp>
+      </p:grpSp>
+      <p:sp>
+        <p:nvSpPr>
+          <p:cNvPr id="170" name="Oval 169">
+            <a:extLst>
+              <a:ext uri="{FF2B5EF4-FFF2-40B4-BE49-F238E27FC236}">
+                <a16:creationId xmlns:a16="http://schemas.microsoft.com/office/drawing/2014/main" id="{AF5D8B5E-01CB-914D-AE2A-3208B3029FB1}"/>
+              </a:ext>
+            </a:extLst>
+          </p:cNvPr>
+          <p:cNvSpPr/>
+          <p:nvPr/>
+        </p:nvSpPr>
+        <p:spPr>
+          <a:xfrm>
+            <a:off x="4056529" y="2029038"/>
+            <a:ext cx="2789362" cy="2789362"/>
+          </a:xfrm>
+          <a:prstGeom prst="ellipse">
+            <a:avLst/>
+          </a:prstGeom>
+          <a:solidFill>
+            <a:schemeClr val="bg1">
+              <a:alpha val="30000"/>
+            </a:schemeClr>
+          </a:solidFill>
+          <a:ln>
+            <a:noFill/>
+          </a:ln>
+        </p:spPr>
+        <p:style>
+          <a:lnRef idx="2">
+            <a:schemeClr val="accent1">
+              <a:shade val="50000"/>
+            </a:schemeClr>
+          </a:lnRef>
+          <a:fillRef idx="1">
+            <a:schemeClr val="accent1"/>
+          </a:fillRef>
+          <a:effectRef idx="0">
+            <a:schemeClr val="accent1"/>
+          </a:effectRef>
+          <a:fontRef idx="minor">
+            <a:schemeClr val="lt1"/>
+          </a:fontRef>
+        </p:style>
+        <p:txBody>
+          <a:bodyPr rtlCol="0" anchor="ctr"/>
+          <a:lstStyle/>
+          <a:p>
+            <a:pPr algn="ctr"/>
+            <a:endParaRPr lang="en-US"/>
+          </a:p>
+        </p:txBody>
+      </p:sp>
+      <p:sp>
+        <p:nvSpPr>
+          <p:cNvPr id="185" name="TextBox 184">
+            <a:extLst>
+              <a:ext uri="{FF2B5EF4-FFF2-40B4-BE49-F238E27FC236}">
+                <a16:creationId xmlns:a16="http://schemas.microsoft.com/office/drawing/2014/main" id="{41344702-F504-3C44-9497-A35941EB80F6}"/>
+              </a:ext>
+            </a:extLst>
+          </p:cNvPr>
+          <p:cNvSpPr txBox="1"/>
+          <p:nvPr/>
+        </p:nvSpPr>
+        <p:spPr>
+          <a:xfrm>
+            <a:off x="4168151" y="2996073"/>
+            <a:ext cx="2671244" cy="707886"/>
+          </a:xfrm>
+          <a:prstGeom prst="rect">
+            <a:avLst/>
+          </a:prstGeom>
+          <a:noFill/>
+        </p:spPr>
+        <p:txBody>
+          <a:bodyPr wrap="none" rtlCol="0">
+            <a:spAutoFit/>
+          </a:bodyPr>
+          <a:lstStyle/>
+          <a:p>
+            <a:r>
+              <a:rPr lang="en-US" sz="4000" b="1" dirty="0"/>
+              <a:t>MetaWards</a:t>
+            </a:r>
+          </a:p>
+        </p:txBody>
+      </p:sp>
+      <p:grpSp>
+        <p:nvGrpSpPr>
+          <p:cNvPr id="171" name="Group 170">
+            <a:extLst>
+              <a:ext uri="{FF2B5EF4-FFF2-40B4-BE49-F238E27FC236}">
+                <a16:creationId xmlns:a16="http://schemas.microsoft.com/office/drawing/2014/main" id="{9B53C342-9EC2-3647-ABE8-2320999C8F6C}"/>
+              </a:ext>
+            </a:extLst>
+          </p:cNvPr>
+          <p:cNvGrpSpPr/>
+          <p:nvPr/>
+        </p:nvGrpSpPr>
+        <p:grpSpPr>
+          <a:xfrm>
+            <a:off x="2694449" y="581001"/>
+            <a:ext cx="5663106" cy="5743587"/>
+            <a:chOff x="2694449" y="581001"/>
+            <a:chExt cx="5663106" cy="5743587"/>
+          </a:xfrm>
+        </p:grpSpPr>
+        <p:sp>
+          <p:nvSpPr>
+            <p:cNvPr id="169" name="Freeform 168">
+              <a:extLst>
+                <a:ext uri="{FF2B5EF4-FFF2-40B4-BE49-F238E27FC236}">
+                  <a16:creationId xmlns:a16="http://schemas.microsoft.com/office/drawing/2014/main" id="{18078E85-6969-354E-8645-CD08FEE6DF39}"/>
+                </a:ext>
+              </a:extLst>
+            </p:cNvPr>
+            <p:cNvSpPr/>
+            <p:nvPr/>
+          </p:nvSpPr>
+          <p:spPr>
+            <a:xfrm rot="7151803">
+              <a:off x="5633669" y="684020"/>
+              <a:ext cx="1353100" cy="2148087"/>
+            </a:xfrm>
+            <a:custGeom>
+              <a:avLst/>
+              <a:gdLst>
+                <a:gd name="connsiteX0" fmla="*/ 274369 w 1353100"/>
+                <a:gd name="connsiteY0" fmla="*/ 2148087 h 2148087"/>
+                <a:gd name="connsiteX1" fmla="*/ 208882 w 1353100"/>
+                <a:gd name="connsiteY1" fmla="*/ 2015620 h 2148087"/>
+                <a:gd name="connsiteX2" fmla="*/ 96906 w 1353100"/>
+                <a:gd name="connsiteY2" fmla="*/ 310154 h 2148087"/>
+                <a:gd name="connsiteX3" fmla="*/ 145523 w 1353100"/>
+                <a:gd name="connsiteY3" fmla="*/ 165164 h 2148087"/>
+                <a:gd name="connsiteX4" fmla="*/ 540408 w 1353100"/>
+                <a:gd name="connsiteY4" fmla="*/ 0 h 2148087"/>
+                <a:gd name="connsiteX5" fmla="*/ 755406 w 1353100"/>
+                <a:gd name="connsiteY5" fmla="*/ 310039 h 2148087"/>
+                <a:gd name="connsiteX6" fmla="*/ 753952 w 1353100"/>
+                <a:gd name="connsiteY6" fmla="*/ 315021 h 2148087"/>
+                <a:gd name="connsiteX7" fmla="*/ 1028208 w 1353100"/>
+                <a:gd name="connsiteY7" fmla="*/ 710511 h 2148087"/>
+                <a:gd name="connsiteX8" fmla="*/ 1202349 w 1353100"/>
+                <a:gd name="connsiteY8" fmla="*/ 637675 h 2148087"/>
+                <a:gd name="connsiteX9" fmla="*/ 1175169 w 1353100"/>
+                <a:gd name="connsiteY9" fmla="*/ 754753 h 2148087"/>
+                <a:gd name="connsiteX10" fmla="*/ 1330446 w 1353100"/>
+                <a:gd name="connsiteY10" fmla="*/ 1687749 h 2148087"/>
+                <a:gd name="connsiteX11" fmla="*/ 1353100 w 1353100"/>
+                <a:gd name="connsiteY11" fmla="*/ 1723880 h 2148087"/>
+                <a:gd name="connsiteX12" fmla="*/ 1262733 w 1353100"/>
+                <a:gd name="connsiteY12" fmla="*/ 1949537 h 2148087"/>
+                <a:gd name="connsiteX13" fmla="*/ 890927 w 1353100"/>
+                <a:gd name="connsiteY13" fmla="*/ 1885434 h 2148087"/>
+                <a:gd name="connsiteX14" fmla="*/ 888395 w 1353100"/>
+                <a:gd name="connsiteY14" fmla="*/ 1880902 h 2148087"/>
+                <a:gd name="connsiteX15" fmla="*/ 414114 w 1353100"/>
+                <a:gd name="connsiteY15" fmla="*/ 1799132 h 2148087"/>
+                <a:gd name="connsiteX16" fmla="*/ 274369 w 1353100"/>
+                <a:gd name="connsiteY16" fmla="*/ 2148087 h 2148087"/>
+              </a:gdLst>
+              <a:ahLst/>
+              <a:cxnLst>
+                <a:cxn ang="0">
+                  <a:pos x="connsiteX0" y="connsiteY0"/>
+                </a:cxn>
+                <a:cxn ang="0">
+                  <a:pos x="connsiteX1" y="connsiteY1"/>
+                </a:cxn>
+                <a:cxn ang="0">
+                  <a:pos x="connsiteX2" y="connsiteY2"/>
+                </a:cxn>
+                <a:cxn ang="0">
+                  <a:pos x="connsiteX3" y="connsiteY3"/>
+                </a:cxn>
+                <a:cxn ang="0">
+                  <a:pos x="connsiteX4" y="connsiteY4"/>
+                </a:cxn>
+                <a:cxn ang="0">
+                  <a:pos x="connsiteX5" y="connsiteY5"/>
+                </a:cxn>
+                <a:cxn ang="0">
+                  <a:pos x="connsiteX6" y="connsiteY6"/>
+                </a:cxn>
+                <a:cxn ang="0">
+                  <a:pos x="connsiteX7" y="connsiteY7"/>
+                </a:cxn>
+                <a:cxn ang="0">
+                  <a:pos x="connsiteX8" y="connsiteY8"/>
+                </a:cxn>
+                <a:cxn ang="0">
+                  <a:pos x="connsiteX9" y="connsiteY9"/>
+                </a:cxn>
+                <a:cxn ang="0">
+                  <a:pos x="connsiteX10" y="connsiteY10"/>
+                </a:cxn>
+                <a:cxn ang="0">
+                  <a:pos x="connsiteX11" y="connsiteY11"/>
+                </a:cxn>
+                <a:cxn ang="0">
+                  <a:pos x="connsiteX12" y="connsiteY12"/>
+                </a:cxn>
+                <a:cxn ang="0">
+                  <a:pos x="connsiteX13" y="connsiteY13"/>
+                </a:cxn>
+                <a:cxn ang="0">
+                  <a:pos x="connsiteX14" y="connsiteY14"/>
+                </a:cxn>
+                <a:cxn ang="0">
+                  <a:pos x="connsiteX15" y="connsiteY15"/>
+                </a:cxn>
+                <a:cxn ang="0">
+                  <a:pos x="connsiteX16" y="connsiteY16"/>
+                </a:cxn>
+              </a:cxnLst>
+              <a:rect l="l" t="t" r="r" b="b"/>
+              <a:pathLst>
+                <a:path w="1353100" h="2148087">
+                  <a:moveTo>
+                    <a:pt x="274369" y="2148087"/>
+                  </a:moveTo>
+                  <a:lnTo>
+                    <a:pt x="208882" y="2015620"/>
+                  </a:lnTo>
+                  <a:cubicBezTo>
+                    <a:pt x="-30794" y="1461704"/>
+                    <a:pt x="-58707" y="859957"/>
+                    <a:pt x="96906" y="310154"/>
+                  </a:cubicBezTo>
+                  <a:lnTo>
+                    <a:pt x="145523" y="165164"/>
+                  </a:lnTo>
+                  <a:lnTo>
+                    <a:pt x="540408" y="0"/>
+                  </a:lnTo>
+                  <a:lnTo>
+                    <a:pt x="755406" y="310039"/>
+                  </a:lnTo>
+                  <a:lnTo>
+                    <a:pt x="753952" y="315021"/>
+                  </a:lnTo>
+                  <a:lnTo>
+                    <a:pt x="1028208" y="710511"/>
+                  </a:lnTo>
+                  <a:lnTo>
+                    <a:pt x="1202349" y="637675"/>
+                  </a:lnTo>
+                  <a:lnTo>
+                    <a:pt x="1175169" y="754753"/>
+                  </a:lnTo>
+                  <a:cubicBezTo>
+                    <a:pt x="1118897" y="1063321"/>
+                    <a:pt x="1165493" y="1392560"/>
+                    <a:pt x="1330446" y="1687749"/>
+                  </a:cubicBezTo>
+                  <a:lnTo>
+                    <a:pt x="1353100" y="1723880"/>
+                  </a:lnTo>
+                  <a:lnTo>
+                    <a:pt x="1262733" y="1949537"/>
+                  </a:lnTo>
+                  <a:lnTo>
+                    <a:pt x="890927" y="1885434"/>
+                  </a:lnTo>
+                  <a:lnTo>
+                    <a:pt x="888395" y="1880902"/>
+                  </a:lnTo>
+                  <a:lnTo>
+                    <a:pt x="414114" y="1799132"/>
+                  </a:lnTo>
+                  <a:lnTo>
+                    <a:pt x="274369" y="2148087"/>
+                  </a:lnTo>
+                  <a:close/>
+                </a:path>
+              </a:pathLst>
+            </a:custGeom>
+            <a:gradFill flip="none" rotWithShape="1">
+              <a:gsLst>
+                <a:gs pos="0">
+                  <a:schemeClr val="accent5">
+                    <a:lumMod val="40000"/>
+                    <a:lumOff val="60000"/>
+                  </a:schemeClr>
+                </a:gs>
+                <a:gs pos="46000">
+                  <a:schemeClr val="accent5">
+                    <a:lumMod val="95000"/>
+                    <a:lumOff val="5000"/>
+                  </a:schemeClr>
+                </a:gs>
+                <a:gs pos="100000">
+                  <a:schemeClr val="accent5">
+                    <a:lumMod val="60000"/>
+                  </a:schemeClr>
+                </a:gs>
+              </a:gsLst>
+              <a:path path="circle">
+                <a:fillToRect l="50000" t="130000" r="50000" b="-30000"/>
+              </a:path>
+              <a:tileRect/>
+            </a:gradFill>
+            <a:ln>
+              <a:solidFill>
+                <a:schemeClr val="tx1"/>
+              </a:solidFill>
+            </a:ln>
+          </p:spPr>
+          <p:style>
+            <a:lnRef idx="2">
+              <a:schemeClr val="accent1">
+                <a:shade val="50000"/>
+              </a:schemeClr>
+            </a:lnRef>
+            <a:fillRef idx="1">
+              <a:schemeClr val="accent1"/>
+            </a:fillRef>
+            <a:effectRef idx="0">
+              <a:schemeClr val="accent1"/>
+            </a:effectRef>
+            <a:fontRef idx="minor">
+              <a:schemeClr val="lt1"/>
+            </a:fontRef>
+          </p:style>
+          <p:txBody>
+            <a:bodyPr rtlCol="0" anchor="ctr"/>
+            <a:lstStyle/>
+            <a:p>
+              <a:pPr algn="ctr"/>
+              <a:endParaRPr lang="en-US" sz="2000" b="1">
+                <a:solidFill>
+                  <a:schemeClr val="tx1"/>
+                </a:solidFill>
+              </a:endParaRPr>
+            </a:p>
+          </p:txBody>
+        </p:sp>
+        <p:sp>
+          <p:nvSpPr>
+            <p:cNvPr id="168" name="Freeform 167">
+              <a:extLst>
+                <a:ext uri="{FF2B5EF4-FFF2-40B4-BE49-F238E27FC236}">
+                  <a16:creationId xmlns:a16="http://schemas.microsoft.com/office/drawing/2014/main" id="{79270310-F8AC-7A43-8DB7-B83C15675580}"/>
+                </a:ext>
+              </a:extLst>
+            </p:cNvPr>
+            <p:cNvSpPr/>
+            <p:nvPr/>
+          </p:nvSpPr>
+          <p:spPr>
+            <a:xfrm rot="7151803">
+              <a:off x="3303112" y="911194"/>
+              <a:ext cx="2251294" cy="1590908"/>
+            </a:xfrm>
+            <a:custGeom>
+              <a:avLst/>
+              <a:gdLst>
+                <a:gd name="connsiteX0" fmla="*/ 0 w 2251294"/>
+                <a:gd name="connsiteY0" fmla="*/ 461863 h 1590908"/>
+                <a:gd name="connsiteX1" fmla="*/ 137979 w 2251294"/>
+                <a:gd name="connsiteY1" fmla="*/ 117317 h 1590908"/>
+                <a:gd name="connsiteX2" fmla="*/ 509785 w 2251294"/>
+                <a:gd name="connsiteY2" fmla="*/ 181421 h 1590908"/>
+                <a:gd name="connsiteX3" fmla="*/ 512317 w 2251294"/>
+                <a:gd name="connsiteY3" fmla="*/ 185951 h 1590908"/>
+                <a:gd name="connsiteX4" fmla="*/ 986597 w 2251294"/>
+                <a:gd name="connsiteY4" fmla="*/ 267722 h 1590908"/>
+                <a:gd name="connsiteX5" fmla="*/ 1093811 w 2251294"/>
+                <a:gd name="connsiteY5" fmla="*/ 0 h 1590908"/>
+                <a:gd name="connsiteX6" fmla="*/ 1164565 w 2251294"/>
+                <a:gd name="connsiteY6" fmla="*/ 74257 h 1590908"/>
+                <a:gd name="connsiteX7" fmla="*/ 1878003 w 2251294"/>
+                <a:gd name="connsiteY7" fmla="*/ 435935 h 1590908"/>
+                <a:gd name="connsiteX8" fmla="*/ 1995444 w 2251294"/>
+                <a:gd name="connsiteY8" fmla="*/ 451587 h 1590908"/>
+                <a:gd name="connsiteX9" fmla="*/ 2251294 w 2251294"/>
+                <a:gd name="connsiteY9" fmla="*/ 767774 h 1590908"/>
+                <a:gd name="connsiteX10" fmla="*/ 2013965 w 2251294"/>
+                <a:gd name="connsiteY10" fmla="*/ 1061072 h 1590908"/>
+                <a:gd name="connsiteX11" fmla="*/ 2008774 w 2251294"/>
+                <a:gd name="connsiteY11" fmla="*/ 1061072 h 1590908"/>
+                <a:gd name="connsiteX12" fmla="*/ 1706034 w 2251294"/>
+                <a:gd name="connsiteY12" fmla="*/ 1435206 h 1590908"/>
+                <a:gd name="connsiteX13" fmla="*/ 1832023 w 2251294"/>
+                <a:gd name="connsiteY13" fmla="*/ 1590908 h 1590908"/>
+                <a:gd name="connsiteX14" fmla="*/ 1671924 w 2251294"/>
+                <a:gd name="connsiteY14" fmla="*/ 1569568 h 1590908"/>
+                <a:gd name="connsiteX15" fmla="*/ 39601 w 2251294"/>
+                <a:gd name="connsiteY15" fmla="*/ 525023 h 1590908"/>
+                <a:gd name="connsiteX16" fmla="*/ 0 w 2251294"/>
+                <a:gd name="connsiteY16" fmla="*/ 461863 h 1590908"/>
+              </a:gdLst>
+              <a:ahLst/>
+              <a:cxnLst>
+                <a:cxn ang="0">
+                  <a:pos x="connsiteX0" y="connsiteY0"/>
+                </a:cxn>
+                <a:cxn ang="0">
+                  <a:pos x="connsiteX1" y="connsiteY1"/>
+                </a:cxn>
+                <a:cxn ang="0">
+                  <a:pos x="connsiteX2" y="connsiteY2"/>
+                </a:cxn>
+                <a:cxn ang="0">
+                  <a:pos x="connsiteX3" y="connsiteY3"/>
+                </a:cxn>
+                <a:cxn ang="0">
+                  <a:pos x="connsiteX4" y="connsiteY4"/>
+                </a:cxn>
+                <a:cxn ang="0">
+                  <a:pos x="connsiteX5" y="connsiteY5"/>
+                </a:cxn>
+                <a:cxn ang="0">
+                  <a:pos x="connsiteX6" y="connsiteY6"/>
+                </a:cxn>
+                <a:cxn ang="0">
+                  <a:pos x="connsiteX7" y="connsiteY7"/>
+                </a:cxn>
+                <a:cxn ang="0">
+                  <a:pos x="connsiteX8" y="connsiteY8"/>
+                </a:cxn>
+                <a:cxn ang="0">
+                  <a:pos x="connsiteX9" y="connsiteY9"/>
+                </a:cxn>
+                <a:cxn ang="0">
+                  <a:pos x="connsiteX10" y="connsiteY10"/>
+                </a:cxn>
+                <a:cxn ang="0">
+                  <a:pos x="connsiteX11" y="connsiteY11"/>
+                </a:cxn>
+                <a:cxn ang="0">
+                  <a:pos x="connsiteX12" y="connsiteY12"/>
+                </a:cxn>
+                <a:cxn ang="0">
+                  <a:pos x="connsiteX13" y="connsiteY13"/>
+                </a:cxn>
+                <a:cxn ang="0">
+                  <a:pos x="connsiteX14" y="connsiteY14"/>
+                </a:cxn>
+                <a:cxn ang="0">
+                  <a:pos x="connsiteX15" y="connsiteY15"/>
+                </a:cxn>
+                <a:cxn ang="0">
+                  <a:pos x="connsiteX16" y="connsiteY16"/>
+                </a:cxn>
+              </a:cxnLst>
+              <a:rect l="l" t="t" r="r" b="b"/>
+              <a:pathLst>
+                <a:path w="2251294" h="1590908">
+                  <a:moveTo>
+                    <a:pt x="0" y="461863"/>
+                  </a:moveTo>
+                  <a:lnTo>
+                    <a:pt x="137979" y="117317"/>
+                  </a:lnTo>
+                  <a:lnTo>
+                    <a:pt x="509785" y="181421"/>
+                  </a:lnTo>
+                  <a:lnTo>
+                    <a:pt x="512317" y="185951"/>
+                  </a:lnTo>
+                  <a:lnTo>
+                    <a:pt x="986597" y="267722"/>
+                  </a:lnTo>
+                  <a:lnTo>
+                    <a:pt x="1093811" y="0"/>
+                  </a:lnTo>
+                  <a:lnTo>
+                    <a:pt x="1164565" y="74257"/>
+                  </a:lnTo>
+                  <a:cubicBezTo>
+                    <a:pt x="1364217" y="263890"/>
+                    <a:pt x="1613517" y="387701"/>
+                    <a:pt x="1878003" y="435935"/>
+                  </a:cubicBezTo>
+                  <a:lnTo>
+                    <a:pt x="1995444" y="451587"/>
+                  </a:lnTo>
+                  <a:lnTo>
+                    <a:pt x="2251294" y="767774"/>
+                  </a:lnTo>
+                  <a:lnTo>
+                    <a:pt x="2013965" y="1061072"/>
+                  </a:lnTo>
+                  <a:lnTo>
+                    <a:pt x="2008774" y="1061072"/>
+                  </a:lnTo>
+                  <a:lnTo>
+                    <a:pt x="1706034" y="1435206"/>
+                  </a:lnTo>
+                  <a:lnTo>
+                    <a:pt x="1832023" y="1590908"/>
+                  </a:lnTo>
+                  <a:lnTo>
+                    <a:pt x="1671924" y="1569568"/>
+                  </a:lnTo>
+                  <a:cubicBezTo>
+                    <a:pt x="1028943" y="1452311"/>
+                    <a:pt x="435190" y="1090077"/>
+                    <a:pt x="39601" y="525023"/>
+                  </a:cubicBezTo>
+                  <a:lnTo>
+                    <a:pt x="0" y="461863"/>
+                  </a:lnTo>
+                  <a:close/>
+                </a:path>
+              </a:pathLst>
+            </a:custGeom>
+            <a:gradFill flip="none" rotWithShape="1">
+              <a:gsLst>
+                <a:gs pos="0">
+                  <a:schemeClr val="accent6">
+                    <a:lumMod val="89000"/>
+                  </a:schemeClr>
+                </a:gs>
+                <a:gs pos="23000">
+                  <a:schemeClr val="accent6">
+                    <a:lumMod val="89000"/>
+                  </a:schemeClr>
+                </a:gs>
+                <a:gs pos="69000">
+                  <a:schemeClr val="accent6">
+                    <a:lumMod val="75000"/>
+                  </a:schemeClr>
+                </a:gs>
+                <a:gs pos="97000">
+                  <a:schemeClr val="accent6">
+                    <a:lumMod val="70000"/>
+                  </a:schemeClr>
+                </a:gs>
+              </a:gsLst>
+              <a:path path="circle">
+                <a:fillToRect l="50000" t="50000" r="50000" b="50000"/>
+              </a:path>
+              <a:tileRect/>
+            </a:gradFill>
+            <a:ln>
+              <a:solidFill>
+                <a:schemeClr val="tx1"/>
+              </a:solidFill>
+            </a:ln>
+          </p:spPr>
+          <p:style>
+            <a:lnRef idx="2">
+              <a:schemeClr val="accent1">
+                <a:shade val="50000"/>
+              </a:schemeClr>
+            </a:lnRef>
+            <a:fillRef idx="1">
+              <a:schemeClr val="accent1"/>
+            </a:fillRef>
+            <a:effectRef idx="0">
+              <a:schemeClr val="accent1"/>
+            </a:effectRef>
+            <a:fontRef idx="minor">
+              <a:schemeClr val="lt1"/>
+            </a:fontRef>
+          </p:style>
+          <p:txBody>
+            <a:bodyPr rtlCol="0" anchor="ctr"/>
+            <a:lstStyle/>
+            <a:p>
+              <a:pPr algn="ctr"/>
+              <a:endParaRPr lang="en-US" sz="2000" b="1">
+                <a:solidFill>
+                  <a:srgbClr val="FFFF00"/>
+                </a:solidFill>
+              </a:endParaRPr>
+            </a:p>
+          </p:txBody>
+        </p:sp>
+        <p:sp>
+          <p:nvSpPr>
+            <p:cNvPr id="165" name="Freeform 164">
+              <a:extLst>
+                <a:ext uri="{FF2B5EF4-FFF2-40B4-BE49-F238E27FC236}">
+                  <a16:creationId xmlns:a16="http://schemas.microsoft.com/office/drawing/2014/main" id="{B3E0CE62-B671-AB48-B661-A5235682F655}"/>
+                </a:ext>
+              </a:extLst>
+            </p:cNvPr>
+            <p:cNvSpPr/>
+            <p:nvPr/>
+          </p:nvSpPr>
+          <p:spPr>
+            <a:xfrm rot="7151803">
+              <a:off x="6267440" y="2200753"/>
+              <a:ext cx="2232358" cy="1947873"/>
+            </a:xfrm>
+            <a:custGeom>
+              <a:avLst/>
+              <a:gdLst>
+                <a:gd name="connsiteX0" fmla="*/ 0 w 2232358"/>
+                <a:gd name="connsiteY0" fmla="*/ 1384539 h 1947873"/>
+                <a:gd name="connsiteX1" fmla="*/ 1174 w 2232358"/>
+                <a:gd name="connsiteY1" fmla="*/ 1381903 h 1947873"/>
+                <a:gd name="connsiteX2" fmla="*/ 1034000 w 2232358"/>
+                <a:gd name="connsiteY2" fmla="*/ 305544 h 1947873"/>
+                <a:gd name="connsiteX3" fmla="*/ 1752346 w 2232358"/>
+                <a:gd name="connsiteY3" fmla="*/ 35542 h 1947873"/>
+                <a:gd name="connsiteX4" fmla="*/ 1974394 w 2232358"/>
+                <a:gd name="connsiteY4" fmla="*/ 0 h 1947873"/>
+                <a:gd name="connsiteX5" fmla="*/ 2232358 w 2232358"/>
+                <a:gd name="connsiteY5" fmla="*/ 279903 h 1947873"/>
+                <a:gd name="connsiteX6" fmla="*/ 2014371 w 2232358"/>
+                <a:gd name="connsiteY6" fmla="*/ 587850 h 1947873"/>
+                <a:gd name="connsiteX7" fmla="*/ 2009192 w 2232358"/>
+                <a:gd name="connsiteY7" fmla="*/ 588184 h 1947873"/>
+                <a:gd name="connsiteX8" fmla="*/ 1731126 w 2232358"/>
+                <a:gd name="connsiteY8" fmla="*/ 981003 h 1947873"/>
+                <a:gd name="connsiteX9" fmla="*/ 1916877 w 2232358"/>
+                <a:gd name="connsiteY9" fmla="*/ 1182554 h 1947873"/>
+                <a:gd name="connsiteX10" fmla="*/ 1856128 w 2232358"/>
+                <a:gd name="connsiteY10" fmla="*/ 1198578 h 1947873"/>
+                <a:gd name="connsiteX11" fmla="*/ 1596046 w 2232358"/>
+                <a:gd name="connsiteY11" fmla="*/ 1311342 h 1947873"/>
+                <a:gd name="connsiteX12" fmla="*/ 1096116 w 2232358"/>
+                <a:gd name="connsiteY12" fmla="*/ 1784201 h 1947873"/>
+                <a:gd name="connsiteX13" fmla="*/ 1054249 w 2232358"/>
+                <a:gd name="connsiteY13" fmla="*/ 1858129 h 1947873"/>
+                <a:gd name="connsiteX14" fmla="*/ 839683 w 2232358"/>
+                <a:gd name="connsiteY14" fmla="*/ 1947873 h 1947873"/>
+                <a:gd name="connsiteX15" fmla="*/ 624683 w 2232358"/>
+                <a:gd name="connsiteY15" fmla="*/ 1637834 h 1947873"/>
+                <a:gd name="connsiteX16" fmla="*/ 626139 w 2232358"/>
+                <a:gd name="connsiteY16" fmla="*/ 1632851 h 1947873"/>
+                <a:gd name="connsiteX17" fmla="*/ 351882 w 2232358"/>
+                <a:gd name="connsiteY17" fmla="*/ 1237362 h 1947873"/>
+                <a:gd name="connsiteX18" fmla="*/ 0 w 2232358"/>
+                <a:gd name="connsiteY18" fmla="*/ 1384539 h 1947873"/>
+              </a:gdLst>
+              <a:ahLst/>
+              <a:cxnLst>
+                <a:cxn ang="0">
+                  <a:pos x="connsiteX0" y="connsiteY0"/>
+                </a:cxn>
+                <a:cxn ang="0">
+                  <a:pos x="connsiteX1" y="connsiteY1"/>
+                </a:cxn>
+                <a:cxn ang="0">
+                  <a:pos x="connsiteX2" y="connsiteY2"/>
+                </a:cxn>
+                <a:cxn ang="0">
+                  <a:pos x="connsiteX3" y="connsiteY3"/>
+                </a:cxn>
+                <a:cxn ang="0">
+                  <a:pos x="connsiteX4" y="connsiteY4"/>
+                </a:cxn>
+                <a:cxn ang="0">
+                  <a:pos x="connsiteX5" y="connsiteY5"/>
+                </a:cxn>
+                <a:cxn ang="0">
+                  <a:pos x="connsiteX6" y="connsiteY6"/>
+                </a:cxn>
+                <a:cxn ang="0">
+                  <a:pos x="connsiteX7" y="connsiteY7"/>
+                </a:cxn>
+                <a:cxn ang="0">
+                  <a:pos x="connsiteX8" y="connsiteY8"/>
+                </a:cxn>
+                <a:cxn ang="0">
+                  <a:pos x="connsiteX9" y="connsiteY9"/>
+                </a:cxn>
+                <a:cxn ang="0">
+                  <a:pos x="connsiteX10" y="connsiteY10"/>
+                </a:cxn>
+                <a:cxn ang="0">
+                  <a:pos x="connsiteX11" y="connsiteY11"/>
+                </a:cxn>
+                <a:cxn ang="0">
+                  <a:pos x="connsiteX12" y="connsiteY12"/>
+                </a:cxn>
+                <a:cxn ang="0">
+                  <a:pos x="connsiteX13" y="connsiteY13"/>
+                </a:cxn>
+                <a:cxn ang="0">
+                  <a:pos x="connsiteX14" y="connsiteY14"/>
+                </a:cxn>
+                <a:cxn ang="0">
+                  <a:pos x="connsiteX15" y="connsiteY15"/>
+                </a:cxn>
+                <a:cxn ang="0">
+                  <a:pos x="connsiteX16" y="connsiteY16"/>
+                </a:cxn>
+                <a:cxn ang="0">
+                  <a:pos x="connsiteX17" y="connsiteY17"/>
+                </a:cxn>
+                <a:cxn ang="0">
+                  <a:pos x="connsiteX18" y="connsiteY18"/>
+                </a:cxn>
+              </a:cxnLst>
+              <a:rect l="l" t="t" r="r" b="b"/>
+              <a:pathLst>
+                <a:path w="2232358" h="1947873">
+                  <a:moveTo>
+                    <a:pt x="0" y="1384539"/>
+                  </a:moveTo>
+                  <a:lnTo>
+                    <a:pt x="1174" y="1381903"/>
+                  </a:lnTo>
+                  <a:cubicBezTo>
+                    <a:pt x="222471" y="943066"/>
+                    <a:pt x="572674" y="563336"/>
+                    <a:pt x="1034000" y="305544"/>
+                  </a:cubicBezTo>
+                  <a:cubicBezTo>
+                    <a:pt x="1264664" y="176648"/>
+                    <a:pt x="1506730" y="87389"/>
+                    <a:pt x="1752346" y="35542"/>
+                  </a:cubicBezTo>
+                  <a:lnTo>
+                    <a:pt x="1974394" y="0"/>
+                  </a:lnTo>
+                  <a:lnTo>
+                    <a:pt x="2232358" y="279903"/>
+                  </a:lnTo>
+                  <a:lnTo>
+                    <a:pt x="2014371" y="587850"/>
+                  </a:lnTo>
+                  <a:lnTo>
+                    <a:pt x="2009192" y="588184"/>
+                  </a:lnTo>
+                  <a:lnTo>
+                    <a:pt x="1731126" y="981003"/>
+                  </a:lnTo>
+                  <a:lnTo>
+                    <a:pt x="1916877" y="1182554"/>
+                  </a:lnTo>
+                  <a:lnTo>
+                    <a:pt x="1856128" y="1198578"/>
+                  </a:lnTo>
+                  <a:cubicBezTo>
+                    <a:pt x="1767505" y="1226745"/>
+                    <a:pt x="1680386" y="1264213"/>
+                    <a:pt x="1596046" y="1311342"/>
+                  </a:cubicBezTo>
+                  <a:cubicBezTo>
+                    <a:pt x="1385197" y="1429166"/>
+                    <a:pt x="1216672" y="1593433"/>
+                    <a:pt x="1096116" y="1784201"/>
+                  </a:cubicBezTo>
+                  <a:lnTo>
+                    <a:pt x="1054249" y="1858129"/>
+                  </a:lnTo>
+                  <a:lnTo>
+                    <a:pt x="839683" y="1947873"/>
+                  </a:lnTo>
+                  <a:lnTo>
+                    <a:pt x="624683" y="1637834"/>
+                  </a:lnTo>
+                  <a:lnTo>
+                    <a:pt x="626139" y="1632851"/>
+                  </a:lnTo>
+                  <a:lnTo>
+                    <a:pt x="351882" y="1237362"/>
+                  </a:lnTo>
+                  <a:lnTo>
+                    <a:pt x="0" y="1384539"/>
+                  </a:lnTo>
+                  <a:close/>
+                </a:path>
+              </a:pathLst>
+            </a:custGeom>
+            <a:gradFill flip="none" rotWithShape="1">
+              <a:gsLst>
+                <a:gs pos="0">
+                  <a:schemeClr val="accent2">
+                    <a:lumMod val="67000"/>
+                  </a:schemeClr>
+                </a:gs>
+                <a:gs pos="48000">
+                  <a:schemeClr val="accent2">
+                    <a:lumMod val="97000"/>
+                    <a:lumOff val="3000"/>
+                  </a:schemeClr>
+                </a:gs>
+                <a:gs pos="100000">
+                  <a:schemeClr val="accent2">
+                    <a:lumMod val="60000"/>
+                    <a:lumOff val="40000"/>
+                  </a:schemeClr>
+                </a:gs>
+              </a:gsLst>
+              <a:lin ang="16200000" scaled="1"/>
+              <a:tileRect/>
+            </a:gradFill>
+            <a:ln>
+              <a:solidFill>
+                <a:schemeClr val="tx1"/>
+              </a:solidFill>
+            </a:ln>
+          </p:spPr>
+          <p:style>
+            <a:lnRef idx="2">
+              <a:schemeClr val="accent1">
+                <a:shade val="50000"/>
+              </a:schemeClr>
+            </a:lnRef>
+            <a:fillRef idx="1">
+              <a:schemeClr val="accent1"/>
+            </a:fillRef>
+            <a:effectRef idx="0">
+              <a:schemeClr val="accent1"/>
+            </a:effectRef>
+            <a:fontRef idx="minor">
+              <a:schemeClr val="lt1"/>
+            </a:fontRef>
+          </p:style>
+          <p:txBody>
+            <a:bodyPr rtlCol="0" anchor="ctr"/>
+            <a:lstStyle/>
+            <a:p>
+              <a:pPr algn="ctr"/>
+              <a:endParaRPr lang="en-US" sz="2000" b="1">
+                <a:solidFill>
+                  <a:schemeClr val="tx1"/>
+                </a:solidFill>
+              </a:endParaRPr>
+            </a:p>
+          </p:txBody>
+        </p:sp>
+        <p:sp>
+          <p:nvSpPr>
+            <p:cNvPr id="163" name="Freeform 162">
+              <a:extLst>
+                <a:ext uri="{FF2B5EF4-FFF2-40B4-BE49-F238E27FC236}">
+                  <a16:creationId xmlns:a16="http://schemas.microsoft.com/office/drawing/2014/main" id="{54C05919-719B-FD42-B647-45D8E12C6AAB}"/>
+                </a:ext>
+              </a:extLst>
+            </p:cNvPr>
+            <p:cNvSpPr/>
+            <p:nvPr/>
+          </p:nvSpPr>
+          <p:spPr>
+            <a:xfrm rot="7151803">
+              <a:off x="2504935" y="2538118"/>
+              <a:ext cx="2002824" cy="1623796"/>
+            </a:xfrm>
+            <a:custGeom>
+              <a:avLst/>
+              <a:gdLst>
+                <a:gd name="connsiteX0" fmla="*/ 0 w 2002824"/>
+                <a:gd name="connsiteY0" fmla="*/ 1448082 h 1623796"/>
+                <a:gd name="connsiteX1" fmla="*/ 237330 w 2002824"/>
+                <a:gd name="connsiteY1" fmla="*/ 1154784 h 1623796"/>
+                <a:gd name="connsiteX2" fmla="*/ 242520 w 2002824"/>
+                <a:gd name="connsiteY2" fmla="*/ 1154784 h 1623796"/>
+                <a:gd name="connsiteX3" fmla="*/ 545260 w 2002824"/>
+                <a:gd name="connsiteY3" fmla="*/ 780648 h 1623796"/>
+                <a:gd name="connsiteX4" fmla="*/ 286671 w 2002824"/>
+                <a:gd name="connsiteY4" fmla="*/ 461076 h 1623796"/>
+                <a:gd name="connsiteX5" fmla="*/ 408242 w 2002824"/>
+                <a:gd name="connsiteY5" fmla="*/ 441617 h 1623796"/>
+                <a:gd name="connsiteX6" fmla="*/ 802226 w 2002824"/>
+                <a:gd name="connsiteY6" fmla="*/ 293532 h 1623796"/>
+                <a:gd name="connsiteX7" fmla="*/ 1034568 w 2002824"/>
+                <a:gd name="connsiteY7" fmla="*/ 131127 h 1623796"/>
+                <a:gd name="connsiteX8" fmla="*/ 1133913 w 2002824"/>
+                <a:gd name="connsiteY8" fmla="*/ 36468 h 1623796"/>
+                <a:gd name="connsiteX9" fmla="*/ 1473379 w 2002824"/>
+                <a:gd name="connsiteY9" fmla="*/ 0 h 1623796"/>
+                <a:gd name="connsiteX10" fmla="*/ 1591056 w 2002824"/>
+                <a:gd name="connsiteY10" fmla="*/ 358469 h 1623796"/>
+                <a:gd name="connsiteX11" fmla="*/ 1588241 w 2002824"/>
+                <a:gd name="connsiteY11" fmla="*/ 362830 h 1623796"/>
+                <a:gd name="connsiteX12" fmla="*/ 1738353 w 2002824"/>
+                <a:gd name="connsiteY12" fmla="*/ 820099 h 1623796"/>
+                <a:gd name="connsiteX13" fmla="*/ 2002824 w 2002824"/>
+                <a:gd name="connsiteY13" fmla="*/ 791688 h 1623796"/>
+                <a:gd name="connsiteX14" fmla="*/ 1970695 w 2002824"/>
+                <a:gd name="connsiteY14" fmla="*/ 829041 h 1623796"/>
+                <a:gd name="connsiteX15" fmla="*/ 1364271 w 2002824"/>
+                <a:gd name="connsiteY15" fmla="*/ 1299328 h 1623796"/>
+                <a:gd name="connsiteX16" fmla="*/ 152289 w 2002824"/>
+                <a:gd name="connsiteY16" fmla="*/ 1623796 h 1623796"/>
+                <a:gd name="connsiteX17" fmla="*/ 141877 w 2002824"/>
+                <a:gd name="connsiteY17" fmla="*/ 1623417 h 1623796"/>
+                <a:gd name="connsiteX18" fmla="*/ 0 w 2002824"/>
+                <a:gd name="connsiteY18" fmla="*/ 1448082 h 1623796"/>
+              </a:gdLst>
+              <a:ahLst/>
+              <a:cxnLst>
+                <a:cxn ang="0">
+                  <a:pos x="connsiteX0" y="connsiteY0"/>
+                </a:cxn>
+                <a:cxn ang="0">
+                  <a:pos x="connsiteX1" y="connsiteY1"/>
+                </a:cxn>
+                <a:cxn ang="0">
+                  <a:pos x="connsiteX2" y="connsiteY2"/>
+                </a:cxn>
+                <a:cxn ang="0">
+                  <a:pos x="connsiteX3" y="connsiteY3"/>
+                </a:cxn>
+                <a:cxn ang="0">
+                  <a:pos x="connsiteX4" y="connsiteY4"/>
+                </a:cxn>
+                <a:cxn ang="0">
+                  <a:pos x="connsiteX5" y="connsiteY5"/>
+                </a:cxn>
+                <a:cxn ang="0">
+                  <a:pos x="connsiteX6" y="connsiteY6"/>
+                </a:cxn>
+                <a:cxn ang="0">
+                  <a:pos x="connsiteX7" y="connsiteY7"/>
+                </a:cxn>
+                <a:cxn ang="0">
+                  <a:pos x="connsiteX8" y="connsiteY8"/>
+                </a:cxn>
+                <a:cxn ang="0">
+                  <a:pos x="connsiteX9" y="connsiteY9"/>
+                </a:cxn>
+                <a:cxn ang="0">
+                  <a:pos x="connsiteX10" y="connsiteY10"/>
+                </a:cxn>
+                <a:cxn ang="0">
+                  <a:pos x="connsiteX11" y="connsiteY11"/>
+                </a:cxn>
+                <a:cxn ang="0">
+                  <a:pos x="connsiteX12" y="connsiteY12"/>
+                </a:cxn>
+                <a:cxn ang="0">
+                  <a:pos x="connsiteX13" y="connsiteY13"/>
+                </a:cxn>
+                <a:cxn ang="0">
+                  <a:pos x="connsiteX14" y="connsiteY14"/>
+                </a:cxn>
+                <a:cxn ang="0">
+                  <a:pos x="connsiteX15" y="connsiteY15"/>
+                </a:cxn>
+                <a:cxn ang="0">
+                  <a:pos x="connsiteX16" y="connsiteY16"/>
+                </a:cxn>
+                <a:cxn ang="0">
+                  <a:pos x="connsiteX17" y="connsiteY17"/>
+                </a:cxn>
+                <a:cxn ang="0">
+                  <a:pos x="connsiteX18" y="connsiteY18"/>
+                </a:cxn>
+              </a:cxnLst>
+              <a:rect l="l" t="t" r="r" b="b"/>
+              <a:pathLst>
+                <a:path w="2002824" h="1623796">
+                  <a:moveTo>
+                    <a:pt x="0" y="1448082"/>
+                  </a:moveTo>
+                  <a:lnTo>
+                    <a:pt x="237330" y="1154784"/>
+                  </a:lnTo>
+                  <a:lnTo>
+                    <a:pt x="242520" y="1154784"/>
+                  </a:lnTo>
+                  <a:lnTo>
+                    <a:pt x="545260" y="780648"/>
+                  </a:lnTo>
+                  <a:lnTo>
+                    <a:pt x="286671" y="461076"/>
+                  </a:lnTo>
+                  <a:lnTo>
+                    <a:pt x="408242" y="441617"/>
+                  </a:lnTo>
+                  <a:cubicBezTo>
+                    <a:pt x="542952" y="413181"/>
+                    <a:pt x="675716" y="364226"/>
+                    <a:pt x="802226" y="293532"/>
+                  </a:cubicBezTo>
+                  <a:cubicBezTo>
+                    <a:pt x="886565" y="246403"/>
+                    <a:pt x="964133" y="191842"/>
+                    <a:pt x="1034568" y="131127"/>
+                  </a:cubicBezTo>
+                  <a:lnTo>
+                    <a:pt x="1133913" y="36468"/>
+                  </a:lnTo>
+                  <a:lnTo>
+                    <a:pt x="1473379" y="0"/>
+                  </a:lnTo>
+                  <a:lnTo>
+                    <a:pt x="1591056" y="358469"/>
+                  </a:lnTo>
+                  <a:lnTo>
+                    <a:pt x="1588241" y="362830"/>
+                  </a:lnTo>
+                  <a:lnTo>
+                    <a:pt x="1738353" y="820099"/>
+                  </a:lnTo>
+                  <a:lnTo>
+                    <a:pt x="2002824" y="791688"/>
+                  </a:lnTo>
+                  <a:lnTo>
+                    <a:pt x="1970695" y="829041"/>
+                  </a:lnTo>
+                  <a:cubicBezTo>
+                    <a:pt x="1797816" y="1011052"/>
+                    <a:pt x="1594934" y="1170432"/>
+                    <a:pt x="1364271" y="1299328"/>
+                  </a:cubicBezTo>
+                  <a:cubicBezTo>
+                    <a:pt x="979832" y="1514155"/>
+                    <a:pt x="563718" y="1618880"/>
+                    <a:pt x="152289" y="1623796"/>
+                  </a:cubicBezTo>
+                  <a:lnTo>
+                    <a:pt x="141877" y="1623417"/>
+                  </a:lnTo>
+                  <a:lnTo>
+                    <a:pt x="0" y="1448082"/>
+                  </a:lnTo>
+                  <a:close/>
+                </a:path>
+              </a:pathLst>
+            </a:custGeom>
+            <a:gradFill flip="none" rotWithShape="1">
+              <a:gsLst>
+                <a:gs pos="0">
+                  <a:schemeClr val="accent4">
+                    <a:lumMod val="89000"/>
+                  </a:schemeClr>
+                </a:gs>
+                <a:gs pos="23000">
+                  <a:schemeClr val="accent4">
+                    <a:lumMod val="89000"/>
+                  </a:schemeClr>
+                </a:gs>
+                <a:gs pos="69000">
+                  <a:schemeClr val="accent4">
+                    <a:lumMod val="75000"/>
+                  </a:schemeClr>
+                </a:gs>
+                <a:gs pos="97000">
+                  <a:schemeClr val="accent4">
+                    <a:lumMod val="70000"/>
+                  </a:schemeClr>
+                </a:gs>
+              </a:gsLst>
+              <a:path path="circle">
+                <a:fillToRect l="50000" t="50000" r="50000" b="50000"/>
+              </a:path>
+              <a:tileRect/>
+            </a:gradFill>
+            <a:ln>
+              <a:solidFill>
+                <a:schemeClr val="tx1"/>
+              </a:solidFill>
+            </a:ln>
+          </p:spPr>
+          <p:style>
+            <a:lnRef idx="2">
+              <a:schemeClr val="accent1">
+                <a:shade val="50000"/>
+              </a:schemeClr>
+            </a:lnRef>
+            <a:fillRef idx="1">
+              <a:schemeClr val="accent1"/>
+            </a:fillRef>
+            <a:effectRef idx="0">
+              <a:schemeClr val="accent1"/>
+            </a:effectRef>
+            <a:fontRef idx="minor">
+              <a:schemeClr val="lt1"/>
+            </a:fontRef>
+          </p:style>
+          <p:txBody>
+            <a:bodyPr rtlCol="0" anchor="ctr"/>
+            <a:lstStyle/>
+            <a:p>
+              <a:pPr algn="ctr"/>
+              <a:endParaRPr lang="en-US" sz="2000" b="1">
+                <a:solidFill>
+                  <a:schemeClr val="tx1"/>
+                </a:solidFill>
+              </a:endParaRPr>
+            </a:p>
+          </p:txBody>
+        </p:sp>
+        <p:sp>
+          <p:nvSpPr>
+            <p:cNvPr id="158" name="Freeform 157">
+              <a:extLst>
+                <a:ext uri="{FF2B5EF4-FFF2-40B4-BE49-F238E27FC236}">
+                  <a16:creationId xmlns:a16="http://schemas.microsoft.com/office/drawing/2014/main" id="{29893D34-23DC-CD43-8EFA-0599477F0214}"/>
+                </a:ext>
+              </a:extLst>
+            </p:cNvPr>
+            <p:cNvSpPr/>
+            <p:nvPr/>
+          </p:nvSpPr>
+          <p:spPr>
+            <a:xfrm rot="7151803">
+              <a:off x="5257633" y="4266148"/>
+              <a:ext cx="2431185" cy="1685696"/>
+            </a:xfrm>
+            <a:custGeom>
+              <a:avLst/>
+              <a:gdLst>
+                <a:gd name="connsiteX0" fmla="*/ 0 w 2431185"/>
+                <a:gd name="connsiteY0" fmla="*/ 979300 h 1685696"/>
+                <a:gd name="connsiteX1" fmla="*/ 217986 w 2431185"/>
+                <a:gd name="connsiteY1" fmla="*/ 671354 h 1685696"/>
+                <a:gd name="connsiteX2" fmla="*/ 223166 w 2431185"/>
+                <a:gd name="connsiteY2" fmla="*/ 671020 h 1685696"/>
+                <a:gd name="connsiteX3" fmla="*/ 501232 w 2431185"/>
+                <a:gd name="connsiteY3" fmla="*/ 278199 h 1685696"/>
+                <a:gd name="connsiteX4" fmla="*/ 244839 w 2431185"/>
+                <a:gd name="connsiteY4" fmla="*/ 0 h 1685696"/>
+                <a:gd name="connsiteX5" fmla="*/ 458747 w 2431185"/>
+                <a:gd name="connsiteY5" fmla="*/ 7778 h 1685696"/>
+                <a:gd name="connsiteX6" fmla="*/ 2334204 w 2431185"/>
+                <a:gd name="connsiteY6" fmla="*/ 1084730 h 1685696"/>
+                <a:gd name="connsiteX7" fmla="*/ 2431185 w 2431185"/>
+                <a:gd name="connsiteY7" fmla="*/ 1239407 h 1685696"/>
+                <a:gd name="connsiteX8" fmla="*/ 2290601 w 2431185"/>
+                <a:gd name="connsiteY8" fmla="*/ 1590458 h 1685696"/>
+                <a:gd name="connsiteX9" fmla="*/ 1918795 w 2431185"/>
+                <a:gd name="connsiteY9" fmla="*/ 1526354 h 1685696"/>
+                <a:gd name="connsiteX10" fmla="*/ 1916263 w 2431185"/>
+                <a:gd name="connsiteY10" fmla="*/ 1521824 h 1685696"/>
+                <a:gd name="connsiteX11" fmla="*/ 1441983 w 2431185"/>
+                <a:gd name="connsiteY11" fmla="*/ 1440054 h 1685696"/>
+                <a:gd name="connsiteX12" fmla="*/ 1343611 w 2431185"/>
+                <a:gd name="connsiteY12" fmla="*/ 1685696 h 1685696"/>
+                <a:gd name="connsiteX13" fmla="*/ 1304769 w 2431185"/>
+                <a:gd name="connsiteY13" fmla="*/ 1635756 h 1685696"/>
+                <a:gd name="connsiteX14" fmla="*/ 227529 w 2431185"/>
+                <a:gd name="connsiteY14" fmla="*/ 1151141 h 1685696"/>
+                <a:gd name="connsiteX15" fmla="*/ 162038 w 2431185"/>
+                <a:gd name="connsiteY15" fmla="*/ 1155119 h 1685696"/>
+                <a:gd name="connsiteX16" fmla="*/ 0 w 2431185"/>
+                <a:gd name="connsiteY16" fmla="*/ 979300 h 1685696"/>
+              </a:gdLst>
+              <a:ahLst/>
+              <a:cxnLst>
+                <a:cxn ang="0">
+                  <a:pos x="connsiteX0" y="connsiteY0"/>
+                </a:cxn>
+                <a:cxn ang="0">
+                  <a:pos x="connsiteX1" y="connsiteY1"/>
+                </a:cxn>
+                <a:cxn ang="0">
+                  <a:pos x="connsiteX2" y="connsiteY2"/>
+                </a:cxn>
+                <a:cxn ang="0">
+                  <a:pos x="connsiteX3" y="connsiteY3"/>
+                </a:cxn>
+                <a:cxn ang="0">
+                  <a:pos x="connsiteX4" y="connsiteY4"/>
+                </a:cxn>
+                <a:cxn ang="0">
+                  <a:pos x="connsiteX5" y="connsiteY5"/>
+                </a:cxn>
+                <a:cxn ang="0">
+                  <a:pos x="connsiteX6" y="connsiteY6"/>
+                </a:cxn>
+                <a:cxn ang="0">
+                  <a:pos x="connsiteX7" y="connsiteY7"/>
+                </a:cxn>
+                <a:cxn ang="0">
+                  <a:pos x="connsiteX8" y="connsiteY8"/>
+                </a:cxn>
+                <a:cxn ang="0">
+                  <a:pos x="connsiteX9" y="connsiteY9"/>
+                </a:cxn>
+                <a:cxn ang="0">
+                  <a:pos x="connsiteX10" y="connsiteY10"/>
+                </a:cxn>
+                <a:cxn ang="0">
+                  <a:pos x="connsiteX11" y="connsiteY11"/>
+                </a:cxn>
+                <a:cxn ang="0">
+                  <a:pos x="connsiteX12" y="connsiteY12"/>
+                </a:cxn>
+                <a:cxn ang="0">
+                  <a:pos x="connsiteX13" y="connsiteY13"/>
+                </a:cxn>
+                <a:cxn ang="0">
+                  <a:pos x="connsiteX14" y="connsiteY14"/>
+                </a:cxn>
+                <a:cxn ang="0">
+                  <a:pos x="connsiteX15" y="connsiteY15"/>
+                </a:cxn>
+                <a:cxn ang="0">
+                  <a:pos x="connsiteX16" y="connsiteY16"/>
+                </a:cxn>
+              </a:cxnLst>
+              <a:rect l="l" t="t" r="r" b="b"/>
+              <a:pathLst>
+                <a:path w="2431185" h="1685696">
+                  <a:moveTo>
+                    <a:pt x="0" y="979300"/>
+                  </a:moveTo>
+                  <a:lnTo>
+                    <a:pt x="217986" y="671354"/>
+                  </a:lnTo>
+                  <a:lnTo>
+                    <a:pt x="223166" y="671020"/>
+                  </a:lnTo>
+                  <a:lnTo>
+                    <a:pt x="501232" y="278199"/>
+                  </a:lnTo>
+                  <a:lnTo>
+                    <a:pt x="244839" y="0"/>
+                  </a:lnTo>
+                  <a:lnTo>
+                    <a:pt x="458747" y="7778"/>
+                  </a:lnTo>
+                  <a:cubicBezTo>
+                    <a:pt x="1193327" y="70053"/>
+                    <a:pt x="1889166" y="449044"/>
+                    <a:pt x="2334204" y="1084730"/>
+                  </a:cubicBezTo>
+                  <a:lnTo>
+                    <a:pt x="2431185" y="1239407"/>
+                  </a:lnTo>
+                  <a:lnTo>
+                    <a:pt x="2290601" y="1590458"/>
+                  </a:lnTo>
+                  <a:lnTo>
+                    <a:pt x="1918795" y="1526354"/>
+                  </a:lnTo>
+                  <a:lnTo>
+                    <a:pt x="1916263" y="1521824"/>
+                  </a:lnTo>
+                  <a:lnTo>
+                    <a:pt x="1441983" y="1440054"/>
+                  </a:lnTo>
+                  <a:lnTo>
+                    <a:pt x="1343611" y="1685696"/>
+                  </a:lnTo>
+                  <a:lnTo>
+                    <a:pt x="1304769" y="1635756"/>
+                  </a:lnTo>
+                  <a:cubicBezTo>
+                    <a:pt x="1031552" y="1318800"/>
+                    <a:pt x="633704" y="1146289"/>
+                    <a:pt x="227529" y="1151141"/>
+                  </a:cubicBezTo>
+                  <a:lnTo>
+                    <a:pt x="162038" y="1155119"/>
+                  </a:lnTo>
+                  <a:lnTo>
+                    <a:pt x="0" y="979300"/>
+                  </a:lnTo>
+                  <a:close/>
+                </a:path>
+              </a:pathLst>
+            </a:custGeom>
+            <a:gradFill flip="none" rotWithShape="1">
+              <a:gsLst>
+                <a:gs pos="0">
+                  <a:schemeClr val="accent2">
+                    <a:lumMod val="40000"/>
+                    <a:lumOff val="60000"/>
+                  </a:schemeClr>
+                </a:gs>
+                <a:gs pos="46000">
+                  <a:srgbClr val="7030A0"/>
+                </a:gs>
+                <a:gs pos="100000">
+                  <a:srgbClr val="FF0000"/>
+                </a:gs>
+              </a:gsLst>
+              <a:path path="circle">
+                <a:fillToRect l="50000" t="130000" r="50000" b="-30000"/>
+              </a:path>
+              <a:tileRect/>
+            </a:gradFill>
+            <a:ln>
+              <a:solidFill>
+                <a:schemeClr val="tx1"/>
+              </a:solidFill>
+            </a:ln>
+          </p:spPr>
+          <p:style>
+            <a:lnRef idx="2">
+              <a:schemeClr val="accent1">
+                <a:shade val="50000"/>
+              </a:schemeClr>
+            </a:lnRef>
+            <a:fillRef idx="1">
+              <a:schemeClr val="accent1"/>
+            </a:fillRef>
+            <a:effectRef idx="0">
+              <a:schemeClr val="accent1"/>
+            </a:effectRef>
+            <a:fontRef idx="minor">
+              <a:schemeClr val="lt1"/>
+            </a:fontRef>
+          </p:style>
+          <p:txBody>
+            <a:bodyPr rtlCol="0" anchor="ctr"/>
+            <a:lstStyle/>
+            <a:p>
+              <a:pPr algn="ctr"/>
+              <a:endParaRPr lang="en-US" sz="2000" b="1">
+                <a:solidFill>
+                  <a:schemeClr val="tx1"/>
+                </a:solidFill>
+              </a:endParaRPr>
+            </a:p>
+          </p:txBody>
+        </p:sp>
+        <p:sp>
+          <p:nvSpPr>
+            <p:cNvPr id="157" name="Freeform 156">
+              <a:extLst>
+                <a:ext uri="{FF2B5EF4-FFF2-40B4-BE49-F238E27FC236}">
+                  <a16:creationId xmlns:a16="http://schemas.microsoft.com/office/drawing/2014/main" id="{4566D340-AB2A-024E-B0E4-C97BEE68BE8D}"/>
+                </a:ext>
+              </a:extLst>
+            </p:cNvPr>
+            <p:cNvSpPr/>
+            <p:nvPr/>
+          </p:nvSpPr>
+          <p:spPr>
+            <a:xfrm rot="7151803">
+              <a:off x="3666829" y="3692240"/>
+              <a:ext cx="1346011" cy="2531856"/>
+            </a:xfrm>
+            <a:custGeom>
+              <a:avLst/>
+              <a:gdLst>
+                <a:gd name="connsiteX0" fmla="*/ 0 w 1346011"/>
+                <a:gd name="connsiteY0" fmla="*/ 1745266 h 2531856"/>
+                <a:gd name="connsiteX1" fmla="*/ 43028 w 1346011"/>
+                <a:gd name="connsiteY1" fmla="*/ 1669287 h 2531856"/>
+                <a:gd name="connsiteX2" fmla="*/ 79059 w 1346011"/>
+                <a:gd name="connsiteY2" fmla="*/ 483694 h 2531856"/>
+                <a:gd name="connsiteX3" fmla="*/ 47003 w 1346011"/>
+                <a:gd name="connsiteY3" fmla="*/ 418852 h 2531856"/>
+                <a:gd name="connsiteX4" fmla="*/ 138053 w 1346011"/>
+                <a:gd name="connsiteY4" fmla="*/ 191491 h 2531856"/>
+                <a:gd name="connsiteX5" fmla="*/ 509859 w 1346011"/>
+                <a:gd name="connsiteY5" fmla="*/ 255594 h 2531856"/>
+                <a:gd name="connsiteX6" fmla="*/ 512391 w 1346011"/>
+                <a:gd name="connsiteY6" fmla="*/ 260126 h 2531856"/>
+                <a:gd name="connsiteX7" fmla="*/ 986672 w 1346011"/>
+                <a:gd name="connsiteY7" fmla="*/ 341896 h 2531856"/>
+                <a:gd name="connsiteX8" fmla="*/ 1123590 w 1346011"/>
+                <a:gd name="connsiteY8" fmla="*/ 0 h 2531856"/>
+                <a:gd name="connsiteX9" fmla="*/ 1137129 w 1346011"/>
+                <a:gd name="connsiteY9" fmla="*/ 27386 h 2531856"/>
+                <a:gd name="connsiteX10" fmla="*/ 950128 w 1346011"/>
+                <a:gd name="connsiteY10" fmla="*/ 2403266 h 2531856"/>
+                <a:gd name="connsiteX11" fmla="*/ 882903 w 1346011"/>
+                <a:gd name="connsiteY11" fmla="*/ 2498983 h 2531856"/>
+                <a:gd name="connsiteX12" fmla="*/ 576900 w 1346011"/>
+                <a:gd name="connsiteY12" fmla="*/ 2531856 h 2531856"/>
+                <a:gd name="connsiteX13" fmla="*/ 459222 w 1346011"/>
+                <a:gd name="connsiteY13" fmla="*/ 2173386 h 2531856"/>
+                <a:gd name="connsiteX14" fmla="*/ 462038 w 1346011"/>
+                <a:gd name="connsiteY14" fmla="*/ 2169025 h 2531856"/>
+                <a:gd name="connsiteX15" fmla="*/ 311925 w 1346011"/>
+                <a:gd name="connsiteY15" fmla="*/ 1711757 h 2531856"/>
+                <a:gd name="connsiteX16" fmla="*/ 0 w 1346011"/>
+                <a:gd name="connsiteY16" fmla="*/ 1745266 h 2531856"/>
+              </a:gdLst>
+              <a:ahLst/>
+              <a:cxnLst>
+                <a:cxn ang="0">
+                  <a:pos x="connsiteX0" y="connsiteY0"/>
+                </a:cxn>
+                <a:cxn ang="0">
+                  <a:pos x="connsiteX1" y="connsiteY1"/>
+                </a:cxn>
+                <a:cxn ang="0">
+                  <a:pos x="connsiteX2" y="connsiteY2"/>
+                </a:cxn>
+                <a:cxn ang="0">
+                  <a:pos x="connsiteX3" y="connsiteY3"/>
+                </a:cxn>
+                <a:cxn ang="0">
+                  <a:pos x="connsiteX4" y="connsiteY4"/>
+                </a:cxn>
+                <a:cxn ang="0">
+                  <a:pos x="connsiteX5" y="connsiteY5"/>
+                </a:cxn>
+                <a:cxn ang="0">
+                  <a:pos x="connsiteX6" y="connsiteY6"/>
+                </a:cxn>
+                <a:cxn ang="0">
+                  <a:pos x="connsiteX7" y="connsiteY7"/>
+                </a:cxn>
+                <a:cxn ang="0">
+                  <a:pos x="connsiteX8" y="connsiteY8"/>
+                </a:cxn>
+                <a:cxn ang="0">
+                  <a:pos x="connsiteX9" y="connsiteY9"/>
+                </a:cxn>
+                <a:cxn ang="0">
+                  <a:pos x="connsiteX10" y="connsiteY10"/>
+                </a:cxn>
+                <a:cxn ang="0">
+                  <a:pos x="connsiteX11" y="connsiteY11"/>
+                </a:cxn>
+                <a:cxn ang="0">
+                  <a:pos x="connsiteX12" y="connsiteY12"/>
+                </a:cxn>
+                <a:cxn ang="0">
+                  <a:pos x="connsiteX13" y="connsiteY13"/>
+                </a:cxn>
+                <a:cxn ang="0">
+                  <a:pos x="connsiteX14" y="connsiteY14"/>
+                </a:cxn>
+                <a:cxn ang="0">
+                  <a:pos x="connsiteX15" y="connsiteY15"/>
+                </a:cxn>
+                <a:cxn ang="0">
+                  <a:pos x="connsiteX16" y="connsiteY16"/>
+                </a:cxn>
+              </a:cxnLst>
+              <a:rect l="l" t="t" r="r" b="b"/>
+              <a:pathLst>
+                <a:path w="1346011" h="2531856">
+                  <a:moveTo>
+                    <a:pt x="0" y="1745266"/>
+                  </a:moveTo>
+                  <a:lnTo>
+                    <a:pt x="43028" y="1669287"/>
+                  </a:lnTo>
+                  <a:cubicBezTo>
+                    <a:pt x="225087" y="1308260"/>
+                    <a:pt x="248070" y="874294"/>
+                    <a:pt x="79059" y="483694"/>
+                  </a:cubicBezTo>
+                  <a:lnTo>
+                    <a:pt x="47003" y="418852"/>
+                  </a:lnTo>
+                  <a:lnTo>
+                    <a:pt x="138053" y="191491"/>
+                  </a:lnTo>
+                  <a:lnTo>
+                    <a:pt x="509859" y="255594"/>
+                  </a:lnTo>
+                  <a:lnTo>
+                    <a:pt x="512391" y="260126"/>
+                  </a:lnTo>
+                  <a:lnTo>
+                    <a:pt x="986672" y="341896"/>
+                  </a:lnTo>
+                  <a:lnTo>
+                    <a:pt x="1123590" y="0"/>
+                  </a:lnTo>
+                  <a:lnTo>
+                    <a:pt x="1137129" y="27386"/>
+                  </a:lnTo>
+                  <a:cubicBezTo>
+                    <a:pt x="1479524" y="818695"/>
+                    <a:pt x="1389747" y="1707618"/>
+                    <a:pt x="950128" y="2403266"/>
+                  </a:cubicBezTo>
+                  <a:lnTo>
+                    <a:pt x="882903" y="2498983"/>
+                  </a:lnTo>
+                  <a:lnTo>
+                    <a:pt x="576900" y="2531856"/>
+                  </a:lnTo>
+                  <a:lnTo>
+                    <a:pt x="459222" y="2173386"/>
+                  </a:lnTo>
+                  <a:lnTo>
+                    <a:pt x="462038" y="2169025"/>
+                  </a:lnTo>
+                  <a:lnTo>
+                    <a:pt x="311925" y="1711757"/>
+                  </a:lnTo>
+                  <a:lnTo>
+                    <a:pt x="0" y="1745266"/>
+                  </a:lnTo>
+                  <a:close/>
+                </a:path>
+              </a:pathLst>
+            </a:custGeom>
+            <a:gradFill flip="none" rotWithShape="1">
+              <a:gsLst>
+                <a:gs pos="0">
+                  <a:schemeClr val="accent3">
+                    <a:lumMod val="40000"/>
+                    <a:lumOff val="60000"/>
+                  </a:schemeClr>
+                </a:gs>
+                <a:gs pos="46000">
+                  <a:schemeClr val="accent3">
+                    <a:lumMod val="95000"/>
+                    <a:lumOff val="5000"/>
+                  </a:schemeClr>
+                </a:gs>
+                <a:gs pos="100000">
+                  <a:schemeClr val="accent3">
+                    <a:lumMod val="60000"/>
+                  </a:schemeClr>
+                </a:gs>
+              </a:gsLst>
+              <a:path path="circle">
+                <a:fillToRect l="50000" t="130000" r="50000" b="-30000"/>
+              </a:path>
+              <a:tileRect/>
+            </a:gradFill>
+            <a:ln>
+              <a:solidFill>
+                <a:schemeClr val="tx1"/>
+              </a:solidFill>
+            </a:ln>
+          </p:spPr>
+          <p:style>
+            <a:lnRef idx="2">
+              <a:schemeClr val="accent1">
+                <a:shade val="50000"/>
+              </a:schemeClr>
+            </a:lnRef>
+            <a:fillRef idx="1">
+              <a:schemeClr val="accent1"/>
+            </a:fillRef>
+            <a:effectRef idx="0">
+              <a:schemeClr val="accent1"/>
+            </a:effectRef>
+            <a:fontRef idx="minor">
+              <a:schemeClr val="lt1"/>
+            </a:fontRef>
+          </p:style>
+          <p:txBody>
+            <a:bodyPr rtlCol="0" anchor="ctr"/>
+            <a:lstStyle/>
+            <a:p>
+              <a:pPr algn="ctr"/>
+              <a:endParaRPr lang="en-US" sz="2000" b="1">
+                <a:solidFill>
+                  <a:schemeClr val="tx1"/>
+                </a:solidFill>
+              </a:endParaRPr>
+            </a:p>
+          </p:txBody>
+        </p:sp>
+      </p:grpSp>
+    </p:spTree>
+    <p:extLst>
+      <p:ext uri="{BB962C8B-B14F-4D97-AF65-F5344CB8AC3E}">
+        <p14:creationId xmlns:p14="http://schemas.microsoft.com/office/powerpoint/2010/main" val="2092359949"/>
+      </p:ext>
+    </p:extLst>
+  </p:cSld>
+  <p:clrMapOvr>
+    <a:masterClrMapping/>
+  </p:clrMapOvr>
+</p:sld>
+</file>
+
+<file path=ppt/slides/slide4.xml><?xml version="1.0" encoding="utf-8"?>
+<p:sld xmlns:a="http://schemas.openxmlformats.org/drawingml/2006/main" xmlns:r="http://schemas.openxmlformats.org/officeDocument/2006/relationships" xmlns:p="http://schemas.openxmlformats.org/presentationml/2006/main">
+  <p:cSld>
+    <p:spTree>
+      <p:nvGrpSpPr>
+        <p:cNvPr id="1" name=""/>
+        <p:cNvGrpSpPr/>
+        <p:nvPr/>
+      </p:nvGrpSpPr>
+      <p:grpSpPr>
+        <a:xfrm>
+          <a:off x="0" y="0"/>
+          <a:ext cx="0" cy="0"/>
+          <a:chOff x="0" y="0"/>
+          <a:chExt cx="0" cy="0"/>
+        </a:xfrm>
+      </p:grpSpPr>
       <p:sp>
         <p:nvSpPr>
           <p:cNvPr id="14" name="Rectangle 13">

</xml_diff>